<commit_message>
Edited slides and traffic example
</commit_message>
<xml_diff>
--- a/wrangling_with_r.pptx
+++ b/wrangling_with_r.pptx
@@ -286,7 +286,7 @@
               <a:pPr>
                 <a:defRPr/>
               </a:pPr>
-              <a:t>2/23/2017</a:t>
+              <a:t>4/6/2017</a:t>
             </a:fld>
             <a:endParaRPr lang="en-US" dirty="0">
               <a:latin typeface="Corbel"/>
@@ -518,7 +518,7 @@
               <a:pPr>
                 <a:defRPr/>
               </a:pPr>
-              <a:t>2/23/2017</a:t>
+              <a:t>4/6/2017</a:t>
             </a:fld>
             <a:endParaRPr lang="en-US" dirty="0"/>
           </a:p>
@@ -10471,14 +10471,14 @@
           </a:ln>
           <a:extLst>
             <a:ext uri="{909E8E84-426E-40dd-AFC4-6F175D3DCCD1}">
-              <a14:hiddenFill xmlns:a14="http://schemas.microsoft.com/office/drawing/2010/main" xmlns="">
+              <a14:hiddenFill xmlns="" xmlns:a14="http://schemas.microsoft.com/office/drawing/2010/main">
                 <a:solidFill>
                   <a:srgbClr val="FFFFFF"/>
                 </a:solidFill>
               </a14:hiddenFill>
             </a:ext>
             <a:ext uri="{91240B29-F687-4f45-9708-019B960494DF}">
-              <a14:hiddenLine xmlns:a14="http://schemas.microsoft.com/office/drawing/2010/main" xmlns="" w="9525">
+              <a14:hiddenLine xmlns="" xmlns:a14="http://schemas.microsoft.com/office/drawing/2010/main" w="9525">
                 <a:solidFill>
                   <a:srgbClr val="000000"/>
                 </a:solidFill>
@@ -10488,7 +10488,7 @@
               </a14:hiddenLine>
             </a:ext>
             <a:ext uri="{FAA26D3D-D897-4be2-8F04-BA451C77F1D7}">
-              <ma14:placeholderFlag xmlns:ma14="http://schemas.microsoft.com/office/mac/drawingml/2011/main" xmlns="" val="1"/>
+              <ma14:placeholderFlag xmlns="" xmlns:ma14="http://schemas.microsoft.com/office/mac/drawingml/2011/main" val="1"/>
             </a:ext>
           </a:extLst>
         </p:spPr>
@@ -13749,7 +13749,7 @@
             <a:effectLst/>
             <a:extLst>
               <a:ext uri="{91240B29-F687-4f45-9708-019B960494DF}">
-                <a14:hiddenLine xmlns:a14="http://schemas.microsoft.com/office/drawing/2010/main" xmlns="" w="9525" cap="flat">
+                <a14:hiddenLine xmlns="" xmlns:a14="http://schemas.microsoft.com/office/drawing/2010/main" w="9525" cap="flat">
                   <a:solidFill>
                     <a:srgbClr val="808080"/>
                   </a:solidFill>
@@ -13759,7 +13759,7 @@
                 </a14:hiddenLine>
               </a:ext>
               <a:ext uri="{AF507438-7753-43e0-B8FC-AC1667EBCBE1}">
-                <a14:hiddenEffects xmlns:a14="http://schemas.microsoft.com/office/drawing/2010/main" xmlns="">
+                <a14:hiddenEffects xmlns="" xmlns:a14="http://schemas.microsoft.com/office/drawing/2010/main">
                   <a:effectLst>
                     <a:outerShdw blurRad="63500" dist="38099" dir="2700000" algn="ctr" rotWithShape="0">
                       <a:srgbClr val="000000">
@@ -13957,7 +13957,7 @@
             <a:effectLst/>
             <a:extLst>
               <a:ext uri="{91240B29-F687-4f45-9708-019B960494DF}">
-                <a14:hiddenLine xmlns:a14="http://schemas.microsoft.com/office/drawing/2010/main" xmlns="" w="9525" cap="flat">
+                <a14:hiddenLine xmlns="" xmlns:a14="http://schemas.microsoft.com/office/drawing/2010/main" w="9525" cap="flat">
                   <a:solidFill>
                     <a:srgbClr val="808080"/>
                   </a:solidFill>
@@ -13967,7 +13967,7 @@
                 </a14:hiddenLine>
               </a:ext>
               <a:ext uri="{AF507438-7753-43e0-B8FC-AC1667EBCBE1}">
-                <a14:hiddenEffects xmlns:a14="http://schemas.microsoft.com/office/drawing/2010/main" xmlns="">
+                <a14:hiddenEffects xmlns="" xmlns:a14="http://schemas.microsoft.com/office/drawing/2010/main">
                   <a:effectLst>
                     <a:outerShdw blurRad="63500" dist="38099" dir="2700000" algn="ctr" rotWithShape="0">
                       <a:srgbClr val="000000">
@@ -14086,7 +14086,7 @@
             <a:effectLst/>
             <a:extLst>
               <a:ext uri="{91240B29-F687-4f45-9708-019B960494DF}">
-                <a14:hiddenLine xmlns:a14="http://schemas.microsoft.com/office/drawing/2010/main" xmlns="" w="9525" cap="flat">
+                <a14:hiddenLine xmlns="" xmlns:a14="http://schemas.microsoft.com/office/drawing/2010/main" w="9525" cap="flat">
                   <a:solidFill>
                     <a:srgbClr val="808080"/>
                   </a:solidFill>
@@ -14096,7 +14096,7 @@
                 </a14:hiddenLine>
               </a:ext>
               <a:ext uri="{AF507438-7753-43e0-B8FC-AC1667EBCBE1}">
-                <a14:hiddenEffects xmlns:a14="http://schemas.microsoft.com/office/drawing/2010/main" xmlns="">
+                <a14:hiddenEffects xmlns="" xmlns:a14="http://schemas.microsoft.com/office/drawing/2010/main">
                   <a:effectLst>
                     <a:outerShdw blurRad="63500" dist="38099" dir="2700000" algn="ctr" rotWithShape="0">
                       <a:srgbClr val="000000">
@@ -14368,7 +14368,7 @@
             <a:effectLst/>
             <a:extLst>
               <a:ext uri="{91240B29-F687-4f45-9708-019B960494DF}">
-                <a14:hiddenLine xmlns:a14="http://schemas.microsoft.com/office/drawing/2010/main" xmlns="" w="9525" cap="flat">
+                <a14:hiddenLine xmlns="" xmlns:a14="http://schemas.microsoft.com/office/drawing/2010/main" w="9525" cap="flat">
                   <a:solidFill>
                     <a:srgbClr val="808080"/>
                   </a:solidFill>
@@ -14378,7 +14378,7 @@
                 </a14:hiddenLine>
               </a:ext>
               <a:ext uri="{AF507438-7753-43e0-B8FC-AC1667EBCBE1}">
-                <a14:hiddenEffects xmlns:a14="http://schemas.microsoft.com/office/drawing/2010/main" xmlns="">
+                <a14:hiddenEffects xmlns="" xmlns:a14="http://schemas.microsoft.com/office/drawing/2010/main">
                   <a:effectLst>
                     <a:outerShdw blurRad="63500" dist="38099" dir="2700000" algn="ctr" rotWithShape="0">
                       <a:srgbClr val="000000">
@@ -14497,7 +14497,7 @@
             <a:effectLst/>
             <a:extLst>
               <a:ext uri="{91240B29-F687-4f45-9708-019B960494DF}">
-                <a14:hiddenLine xmlns:a14="http://schemas.microsoft.com/office/drawing/2010/main" xmlns="" w="9525" cap="flat">
+                <a14:hiddenLine xmlns="" xmlns:a14="http://schemas.microsoft.com/office/drawing/2010/main" w="9525" cap="flat">
                   <a:solidFill>
                     <a:srgbClr val="808080"/>
                   </a:solidFill>
@@ -14507,7 +14507,7 @@
                 </a14:hiddenLine>
               </a:ext>
               <a:ext uri="{AF507438-7753-43e0-B8FC-AC1667EBCBE1}">
-                <a14:hiddenEffects xmlns:a14="http://schemas.microsoft.com/office/drawing/2010/main" xmlns="">
+                <a14:hiddenEffects xmlns="" xmlns:a14="http://schemas.microsoft.com/office/drawing/2010/main">
                   <a:effectLst>
                     <a:outerShdw blurRad="63500" dist="38099" dir="2700000" algn="ctr" rotWithShape="0">
                       <a:srgbClr val="000000">
@@ -14693,7 +14693,7 @@
             <a:effectLst/>
             <a:extLst>
               <a:ext uri="{91240B29-F687-4f45-9708-019B960494DF}">
-                <a14:hiddenLine xmlns:a14="http://schemas.microsoft.com/office/drawing/2010/main" xmlns="" w="9525" cap="flat">
+                <a14:hiddenLine xmlns="" xmlns:a14="http://schemas.microsoft.com/office/drawing/2010/main" w="9525" cap="flat">
                   <a:solidFill>
                     <a:srgbClr val="808080"/>
                   </a:solidFill>
@@ -14703,7 +14703,7 @@
                 </a14:hiddenLine>
               </a:ext>
               <a:ext uri="{AF507438-7753-43e0-B8FC-AC1667EBCBE1}">
-                <a14:hiddenEffects xmlns:a14="http://schemas.microsoft.com/office/drawing/2010/main" xmlns="">
+                <a14:hiddenEffects xmlns="" xmlns:a14="http://schemas.microsoft.com/office/drawing/2010/main">
                   <a:effectLst>
                     <a:outerShdw blurRad="63500" dist="38099" dir="2700000" algn="ctr" rotWithShape="0">
                       <a:srgbClr val="000000">
@@ -14929,7 +14929,7 @@
             <a:effectLst/>
             <a:extLst>
               <a:ext uri="{91240B29-F687-4f45-9708-019B960494DF}">
-                <a14:hiddenLine xmlns:a14="http://schemas.microsoft.com/office/drawing/2010/main" xmlns="" w="9525" cap="flat">
+                <a14:hiddenLine xmlns="" xmlns:a14="http://schemas.microsoft.com/office/drawing/2010/main" w="9525" cap="flat">
                   <a:solidFill>
                     <a:srgbClr val="808080"/>
                   </a:solidFill>
@@ -14939,7 +14939,7 @@
                 </a14:hiddenLine>
               </a:ext>
               <a:ext uri="{AF507438-7753-43e0-B8FC-AC1667EBCBE1}">
-                <a14:hiddenEffects xmlns:a14="http://schemas.microsoft.com/office/drawing/2010/main" xmlns="">
+                <a14:hiddenEffects xmlns="" xmlns:a14="http://schemas.microsoft.com/office/drawing/2010/main">
                   <a:effectLst>
                     <a:outerShdw blurRad="63500" dist="38099" dir="2700000" algn="ctr" rotWithShape="0">
                       <a:srgbClr val="000000">
@@ -15077,7 +15077,7 @@
             <a:effectLst/>
             <a:extLst>
               <a:ext uri="{91240B29-F687-4f45-9708-019B960494DF}">
-                <a14:hiddenLine xmlns:a14="http://schemas.microsoft.com/office/drawing/2010/main" xmlns="" w="9525" cap="flat">
+                <a14:hiddenLine xmlns="" xmlns:a14="http://schemas.microsoft.com/office/drawing/2010/main" w="9525" cap="flat">
                   <a:solidFill>
                     <a:srgbClr val="808080"/>
                   </a:solidFill>
@@ -15087,7 +15087,7 @@
                 </a14:hiddenLine>
               </a:ext>
               <a:ext uri="{AF507438-7753-43e0-B8FC-AC1667EBCBE1}">
-                <a14:hiddenEffects xmlns:a14="http://schemas.microsoft.com/office/drawing/2010/main" xmlns="">
+                <a14:hiddenEffects xmlns="" xmlns:a14="http://schemas.microsoft.com/office/drawing/2010/main">
                   <a:effectLst>
                     <a:outerShdw blurRad="63500" dist="38099" dir="2700000" algn="ctr" rotWithShape="0">
                       <a:srgbClr val="000000">
@@ -15373,7 +15373,7 @@
             <a:effectLst/>
             <a:extLst>
               <a:ext uri="{91240B29-F687-4f45-9708-019B960494DF}">
-                <a14:hiddenLine xmlns:a14="http://schemas.microsoft.com/office/drawing/2010/main" xmlns="" w="9525" cap="flat">
+                <a14:hiddenLine xmlns="" xmlns:a14="http://schemas.microsoft.com/office/drawing/2010/main" w="9525" cap="flat">
                   <a:solidFill>
                     <a:srgbClr val="808080"/>
                   </a:solidFill>
@@ -15383,7 +15383,7 @@
                 </a14:hiddenLine>
               </a:ext>
               <a:ext uri="{AF507438-7753-43e0-B8FC-AC1667EBCBE1}">
-                <a14:hiddenEffects xmlns:a14="http://schemas.microsoft.com/office/drawing/2010/main" xmlns="">
+                <a14:hiddenEffects xmlns="" xmlns:a14="http://schemas.microsoft.com/office/drawing/2010/main">
                   <a:effectLst>
                     <a:outerShdw blurRad="63500" dist="38099" dir="2700000" algn="ctr" rotWithShape="0">
                       <a:srgbClr val="000000">
@@ -15621,7 +15621,7 @@
             <a:effectLst/>
             <a:extLst>
               <a:ext uri="{91240B29-F687-4f45-9708-019B960494DF}">
-                <a14:hiddenLine xmlns:a14="http://schemas.microsoft.com/office/drawing/2010/main" xmlns="" w="9525" cap="flat">
+                <a14:hiddenLine xmlns="" xmlns:a14="http://schemas.microsoft.com/office/drawing/2010/main" w="9525" cap="flat">
                   <a:solidFill>
                     <a:srgbClr val="808080"/>
                   </a:solidFill>
@@ -15631,7 +15631,7 @@
                 </a14:hiddenLine>
               </a:ext>
               <a:ext uri="{AF507438-7753-43e0-B8FC-AC1667EBCBE1}">
-                <a14:hiddenEffects xmlns:a14="http://schemas.microsoft.com/office/drawing/2010/main" xmlns="">
+                <a14:hiddenEffects xmlns="" xmlns:a14="http://schemas.microsoft.com/office/drawing/2010/main">
                   <a:effectLst>
                     <a:outerShdw blurRad="63500" dist="38099" dir="2700000" algn="ctr" rotWithShape="0">
                       <a:srgbClr val="000000">
@@ -15817,7 +15817,7 @@
             <a:effectLst/>
             <a:extLst>
               <a:ext uri="{91240B29-F687-4f45-9708-019B960494DF}">
-                <a14:hiddenLine xmlns:a14="http://schemas.microsoft.com/office/drawing/2010/main" xmlns="" w="9525" cap="flat">
+                <a14:hiddenLine xmlns="" xmlns:a14="http://schemas.microsoft.com/office/drawing/2010/main" w="9525" cap="flat">
                   <a:solidFill>
                     <a:srgbClr val="808080"/>
                   </a:solidFill>
@@ -15827,7 +15827,7 @@
                 </a14:hiddenLine>
               </a:ext>
               <a:ext uri="{AF507438-7753-43e0-B8FC-AC1667EBCBE1}">
-                <a14:hiddenEffects xmlns:a14="http://schemas.microsoft.com/office/drawing/2010/main" xmlns="">
+                <a14:hiddenEffects xmlns="" xmlns:a14="http://schemas.microsoft.com/office/drawing/2010/main">
                   <a:effectLst>
                     <a:outerShdw blurRad="63500" dist="38099" dir="2700000" algn="ctr" rotWithShape="0">
                       <a:srgbClr val="000000">
@@ -15955,7 +15955,7 @@
             <a:effectLst/>
             <a:extLst>
               <a:ext uri="{91240B29-F687-4f45-9708-019B960494DF}">
-                <a14:hiddenLine xmlns:a14="http://schemas.microsoft.com/office/drawing/2010/main" xmlns="" w="9525" cap="flat">
+                <a14:hiddenLine xmlns="" xmlns:a14="http://schemas.microsoft.com/office/drawing/2010/main" w="9525" cap="flat">
                   <a:solidFill>
                     <a:srgbClr val="808080"/>
                   </a:solidFill>
@@ -15965,7 +15965,7 @@
                 </a14:hiddenLine>
               </a:ext>
               <a:ext uri="{AF507438-7753-43e0-B8FC-AC1667EBCBE1}">
-                <a14:hiddenEffects xmlns:a14="http://schemas.microsoft.com/office/drawing/2010/main" xmlns="">
+                <a14:hiddenEffects xmlns="" xmlns:a14="http://schemas.microsoft.com/office/drawing/2010/main">
                   <a:effectLst>
                     <a:outerShdw blurRad="63500" dist="38099" dir="2700000" algn="ctr" rotWithShape="0">
                       <a:srgbClr val="000000">
@@ -16084,7 +16084,7 @@
             <a:effectLst/>
             <a:extLst>
               <a:ext uri="{91240B29-F687-4f45-9708-019B960494DF}">
-                <a14:hiddenLine xmlns:a14="http://schemas.microsoft.com/office/drawing/2010/main" xmlns="" w="9525" cap="flat">
+                <a14:hiddenLine xmlns="" xmlns:a14="http://schemas.microsoft.com/office/drawing/2010/main" w="9525" cap="flat">
                   <a:solidFill>
                     <a:srgbClr val="808080"/>
                   </a:solidFill>
@@ -16094,7 +16094,7 @@
                 </a14:hiddenLine>
               </a:ext>
               <a:ext uri="{AF507438-7753-43e0-B8FC-AC1667EBCBE1}">
-                <a14:hiddenEffects xmlns:a14="http://schemas.microsoft.com/office/drawing/2010/main" xmlns="">
+                <a14:hiddenEffects xmlns="" xmlns:a14="http://schemas.microsoft.com/office/drawing/2010/main">
                   <a:effectLst>
                     <a:outerShdw blurRad="63500" dist="38099" dir="2700000" algn="ctr" rotWithShape="0">
                       <a:srgbClr val="000000">
@@ -16240,7 +16240,7 @@
             <a:effectLst/>
             <a:extLst>
               <a:ext uri="{91240B29-F687-4f45-9708-019B960494DF}">
-                <a14:hiddenLine xmlns:a14="http://schemas.microsoft.com/office/drawing/2010/main" xmlns="" w="9525" cap="flat">
+                <a14:hiddenLine xmlns="" xmlns:a14="http://schemas.microsoft.com/office/drawing/2010/main" w="9525" cap="flat">
                   <a:solidFill>
                     <a:srgbClr val="808080"/>
                   </a:solidFill>
@@ -16250,7 +16250,7 @@
                 </a14:hiddenLine>
               </a:ext>
               <a:ext uri="{AF507438-7753-43e0-B8FC-AC1667EBCBE1}">
-                <a14:hiddenEffects xmlns:a14="http://schemas.microsoft.com/office/drawing/2010/main" xmlns="">
+                <a14:hiddenEffects xmlns="" xmlns:a14="http://schemas.microsoft.com/office/drawing/2010/main">
                   <a:effectLst>
                     <a:outerShdw blurRad="63500" dist="38099" dir="2700000" algn="ctr" rotWithShape="0">
                       <a:srgbClr val="000000">
@@ -16430,7 +16430,7 @@
             <a:effectLst/>
             <a:extLst>
               <a:ext uri="{91240B29-F687-4f45-9708-019B960494DF}">
-                <a14:hiddenLine xmlns:a14="http://schemas.microsoft.com/office/drawing/2010/main" xmlns="" w="9525" cap="flat">
+                <a14:hiddenLine xmlns="" xmlns:a14="http://schemas.microsoft.com/office/drawing/2010/main" w="9525" cap="flat">
                   <a:solidFill>
                     <a:srgbClr val="808080"/>
                   </a:solidFill>
@@ -16440,7 +16440,7 @@
                 </a14:hiddenLine>
               </a:ext>
               <a:ext uri="{AF507438-7753-43e0-B8FC-AC1667EBCBE1}">
-                <a14:hiddenEffects xmlns:a14="http://schemas.microsoft.com/office/drawing/2010/main" xmlns="">
+                <a14:hiddenEffects xmlns="" xmlns:a14="http://schemas.microsoft.com/office/drawing/2010/main">
                   <a:effectLst>
                     <a:outerShdw blurRad="63500" dist="38099" dir="2700000" algn="ctr" rotWithShape="0">
                       <a:srgbClr val="000000">
@@ -19914,14 +19914,14 @@
           </a:ln>
           <a:extLst>
             <a:ext uri="{909E8E84-426E-40dd-AFC4-6F175D3DCCD1}">
-              <a14:hiddenFill xmlns:a14="http://schemas.microsoft.com/office/drawing/2010/main" xmlns="">
+              <a14:hiddenFill xmlns="" xmlns:a14="http://schemas.microsoft.com/office/drawing/2010/main">
                 <a:solidFill>
                   <a:srgbClr val="FFFFFF"/>
                 </a:solidFill>
               </a14:hiddenFill>
             </a:ext>
             <a:ext uri="{91240B29-F687-4f45-9708-019B960494DF}">
-              <a14:hiddenLine xmlns:a14="http://schemas.microsoft.com/office/drawing/2010/main" xmlns="" w="9525">
+              <a14:hiddenLine xmlns="" xmlns:a14="http://schemas.microsoft.com/office/drawing/2010/main" w="9525">
                 <a:solidFill>
                   <a:srgbClr val="000000"/>
                 </a:solidFill>
@@ -19931,7 +19931,7 @@
               </a14:hiddenLine>
             </a:ext>
             <a:ext uri="{FAA26D3D-D897-4be2-8F04-BA451C77F1D7}">
-              <ma14:placeholderFlag xmlns:ma14="http://schemas.microsoft.com/office/mac/drawingml/2011/main" xmlns="" val="1"/>
+              <ma14:placeholderFlag xmlns="" xmlns:ma14="http://schemas.microsoft.com/office/mac/drawingml/2011/main" val="1"/>
             </a:ext>
           </a:extLst>
         </p:spPr>
@@ -19976,14 +19976,14 @@
           </a:ln>
           <a:extLst>
             <a:ext uri="{909E8E84-426E-40dd-AFC4-6F175D3DCCD1}">
-              <a14:hiddenFill xmlns:a14="http://schemas.microsoft.com/office/drawing/2010/main" xmlns="">
+              <a14:hiddenFill xmlns="" xmlns:a14="http://schemas.microsoft.com/office/drawing/2010/main">
                 <a:solidFill>
                   <a:srgbClr val="FFFFFF"/>
                 </a:solidFill>
               </a14:hiddenFill>
             </a:ext>
             <a:ext uri="{91240B29-F687-4f45-9708-019B960494DF}">
-              <a14:hiddenLine xmlns:a14="http://schemas.microsoft.com/office/drawing/2010/main" xmlns="" w="9525">
+              <a14:hiddenLine xmlns="" xmlns:a14="http://schemas.microsoft.com/office/drawing/2010/main" w="9525">
                 <a:solidFill>
                   <a:srgbClr val="000000"/>
                 </a:solidFill>
@@ -19993,7 +19993,7 @@
               </a14:hiddenLine>
             </a:ext>
             <a:ext uri="{FAA26D3D-D897-4be2-8F04-BA451C77F1D7}">
-              <ma14:placeholderFlag xmlns:ma14="http://schemas.microsoft.com/office/mac/drawingml/2011/main" xmlns="" val="1"/>
+              <ma14:placeholderFlag xmlns="" xmlns:ma14="http://schemas.microsoft.com/office/mac/drawingml/2011/main" val="1"/>
             </a:ext>
           </a:extLst>
         </p:spPr>
@@ -22034,8 +22034,17 @@
             </a:r>
             <a:r>
               <a:rPr lang="en-US" dirty="0" smtClean="0"/>
-              <a:t> functions (left, right, inner or full)</a:t>
-            </a:r>
+              <a:t> functions (left, right, inner or </a:t>
+            </a:r>
+            <a:r>
+              <a:rPr lang="en-US" smtClean="0"/>
+              <a:t>full</a:t>
+            </a:r>
+            <a:r>
+              <a:rPr lang="en-US" smtClean="0"/>
+              <a:t>)</a:t>
+            </a:r>
+            <a:endParaRPr lang="en-US" dirty="0" smtClean="0"/>
           </a:p>
           <a:p>
             <a:pPr lvl="1"/>
@@ -24981,52 +24990,6 @@
 </file>
 
 <file path=customXml/item2.xml><?xml version="1.0" encoding="utf-8"?>
-<p:properties xmlns:p="http://schemas.microsoft.com/office/2006/metadata/properties" xmlns:xsi="http://www.w3.org/2001/XMLSchema-instance" xmlns:pc="http://schemas.microsoft.com/office/infopath/2007/PartnerControls">
-  <documentManagement>
-    <PublishingRollupImage xmlns="http://schemas.microsoft.com/sharepoint/v3" xsi:nil="true"/>
-    <CSC_x0020_Language xmlns="b542780c-f3c1-48de-9090-e65480539529">
-      <Value>English</Value>
-    </CSC_x0020_Language>
-    <Translation xmlns="b542780c-f3c1-48de-9090-e65480539529">
-      <Url xsi:nil="true"/>
-      <Description xsi:nil="true"/>
-    </Translation>
-    <PublishingContactEmail xmlns="http://schemas.microsoft.com/sharepoint/v3" xsi:nil="true"/>
-    <PublishingPageContent xmlns="http://schemas.microsoft.com/sharepoint/v3" xsi:nil="true"/>
-    <PublishingVariationRelationshipLinkFieldID xmlns="http://schemas.microsoft.com/sharepoint/v3">
-      <Url xsi:nil="true"/>
-      <Description xsi:nil="true"/>
-    </PublishingVariationRelationshipLinkFieldID>
-    <CSC_x0020_Category xmlns="b542780c-f3c1-48de-9090-e65480539529">Templates</CSC_x0020_Category>
-    <SeoKeywords xmlns="http://schemas.microsoft.com/sharepoint/v3" xsi:nil="true"/>
-    <PublishingVariationGroupID xmlns="http://schemas.microsoft.com/sharepoint/v3" xsi:nil="true"/>
-    <PublishingIsFurlPage xmlns="http://schemas.microsoft.com/sharepoint/v3">false</PublishingIsFurlPage>
-    <Audience xmlns="http://schemas.microsoft.com/sharepoint/v3" xsi:nil="true"/>
-    <CSC_x0020_Group xmlns="b542780c-f3c1-48de-9090-e65480539529">MARCOM</CSC_x0020_Group>
-    <SeoBrowserTitle xmlns="http://schemas.microsoft.com/sharepoint/v3" xsi:nil="true"/>
-    <PublishingExpirationDate xmlns="http://schemas.microsoft.com/sharepoint/v3" xsi:nil="true"/>
-    <PublishingContactPicture xmlns="http://schemas.microsoft.com/sharepoint/v3">
-      <Url xsi:nil="true"/>
-      <Description xsi:nil="true"/>
-    </PublishingContactPicture>
-    <SeoRobotsNoIndex xmlns="http://schemas.microsoft.com/sharepoint/v3" xsi:nil="true"/>
-    <PublishingStartDate xmlns="http://schemas.microsoft.com/sharepoint/v3" xsi:nil="true"/>
-    <SeoMetaDescription xmlns="http://schemas.microsoft.com/sharepoint/v3" xsi:nil="true"/>
-    <PublishingContact xmlns="http://schemas.microsoft.com/sharepoint/v3">
-      <UserInfo>
-        <DisplayName/>
-        <AccountId xsi:nil="true"/>
-        <AccountType/>
-      </UserInfo>
-    </PublishingContact>
-    <PublishingContactName xmlns="http://schemas.microsoft.com/sharepoint/v3" xsi:nil="true"/>
-    <Comments xmlns="http://schemas.microsoft.com/sharepoint/v3">CSC's official PowerPoint-template
-Version 04.11.2016/Marketing and Communications</Comments>
-  </documentManagement>
-</p:properties>
-</file>
-
-<file path=customXml/item3.xml><?xml version="1.0" encoding="utf-8"?>
 <ct:contentTypeSchema xmlns:ct="http://schemas.microsoft.com/office/2006/metadata/contentType" xmlns:ma="http://schemas.microsoft.com/office/2006/metadata/properties/metaAttributes" ct:_="" ma:_="" ma:contentTypeName="Guidelines Article" ma:contentTypeID="0x010100C568DB52D9D0A14D9B2FDCC96666E9F2007948130EC3DB064584E219954237AF39005865AF1693B9994CA07D29D3EBFFF69500D5CFB1A256BDC0439FEF5B0324F021D6" ma:contentTypeVersion="30" ma:contentTypeDescription="" ma:contentTypeScope="" ma:versionID="4cb75ce876bc9bb0bf3ca65d73c8002f">
   <xsd:schema xmlns:xsd="http://www.w3.org/2001/XMLSchema" xmlns:xs="http://www.w3.org/2001/XMLSchema" xmlns:p="http://schemas.microsoft.com/office/2006/metadata/properties" xmlns:ns1="http://schemas.microsoft.com/sharepoint/v3" xmlns:ns3="b542780c-f3c1-48de-9090-e65480539529" targetNamespace="http://schemas.microsoft.com/office/2006/metadata/properties" ma:root="true" ma:fieldsID="179bbc1ef3caf76c6e1127b99eabb6f9" ns1:_="" ns3:_="">
     <xsd:import namespace="http://schemas.microsoft.com/sharepoint/v3"/>
@@ -25403,6 +25366,52 @@
 </ct:contentTypeSchema>
 </file>
 
+<file path=customXml/item3.xml><?xml version="1.0" encoding="utf-8"?>
+<p:properties xmlns:p="http://schemas.microsoft.com/office/2006/metadata/properties" xmlns:xsi="http://www.w3.org/2001/XMLSchema-instance" xmlns:pc="http://schemas.microsoft.com/office/infopath/2007/PartnerControls">
+  <documentManagement>
+    <PublishingRollupImage xmlns="http://schemas.microsoft.com/sharepoint/v3" xsi:nil="true"/>
+    <CSC_x0020_Language xmlns="b542780c-f3c1-48de-9090-e65480539529">
+      <Value>English</Value>
+    </CSC_x0020_Language>
+    <Translation xmlns="b542780c-f3c1-48de-9090-e65480539529">
+      <Url xsi:nil="true"/>
+      <Description xsi:nil="true"/>
+    </Translation>
+    <PublishingContactEmail xmlns="http://schemas.microsoft.com/sharepoint/v3" xsi:nil="true"/>
+    <PublishingPageContent xmlns="http://schemas.microsoft.com/sharepoint/v3" xsi:nil="true"/>
+    <PublishingVariationRelationshipLinkFieldID xmlns="http://schemas.microsoft.com/sharepoint/v3">
+      <Url xsi:nil="true"/>
+      <Description xsi:nil="true"/>
+    </PublishingVariationRelationshipLinkFieldID>
+    <CSC_x0020_Category xmlns="b542780c-f3c1-48de-9090-e65480539529">Templates</CSC_x0020_Category>
+    <SeoKeywords xmlns="http://schemas.microsoft.com/sharepoint/v3" xsi:nil="true"/>
+    <PublishingVariationGroupID xmlns="http://schemas.microsoft.com/sharepoint/v3" xsi:nil="true"/>
+    <PublishingIsFurlPage xmlns="http://schemas.microsoft.com/sharepoint/v3">false</PublishingIsFurlPage>
+    <Audience xmlns="http://schemas.microsoft.com/sharepoint/v3" xsi:nil="true"/>
+    <CSC_x0020_Group xmlns="b542780c-f3c1-48de-9090-e65480539529">MARCOM</CSC_x0020_Group>
+    <SeoBrowserTitle xmlns="http://schemas.microsoft.com/sharepoint/v3" xsi:nil="true"/>
+    <PublishingExpirationDate xmlns="http://schemas.microsoft.com/sharepoint/v3" xsi:nil="true"/>
+    <PublishingContactPicture xmlns="http://schemas.microsoft.com/sharepoint/v3">
+      <Url xsi:nil="true"/>
+      <Description xsi:nil="true"/>
+    </PublishingContactPicture>
+    <SeoRobotsNoIndex xmlns="http://schemas.microsoft.com/sharepoint/v3" xsi:nil="true"/>
+    <PublishingStartDate xmlns="http://schemas.microsoft.com/sharepoint/v3" xsi:nil="true"/>
+    <SeoMetaDescription xmlns="http://schemas.microsoft.com/sharepoint/v3" xsi:nil="true"/>
+    <PublishingContact xmlns="http://schemas.microsoft.com/sharepoint/v3">
+      <UserInfo>
+        <DisplayName/>
+        <AccountId xsi:nil="true"/>
+        <AccountType/>
+      </UserInfo>
+    </PublishingContact>
+    <PublishingContactName xmlns="http://schemas.microsoft.com/sharepoint/v3" xsi:nil="true"/>
+    <Comments xmlns="http://schemas.microsoft.com/sharepoint/v3">CSC's official PowerPoint-template
+Version 04.11.2016/Marketing and Communications</Comments>
+  </documentManagement>
+</p:properties>
+</file>
+
 <file path=customXml/itemProps1.xml><?xml version="1.0" encoding="utf-8"?>
 <ds:datastoreItem xmlns:ds="http://schemas.openxmlformats.org/officeDocument/2006/customXml" ds:itemID="{D4C4CBFC-2EF1-4092-8F2F-5A5B86A85C2F}">
   <ds:schemaRefs>
@@ -25412,23 +25421,6 @@
 </file>
 
 <file path=customXml/itemProps2.xml><?xml version="1.0" encoding="utf-8"?>
-<ds:datastoreItem xmlns:ds="http://schemas.openxmlformats.org/officeDocument/2006/customXml" ds:itemID="{47279921-A1B4-472D-B7BD-F638B6892104}">
-  <ds:schemaRefs>
-    <ds:schemaRef ds:uri="b542780c-f3c1-48de-9090-e65480539529"/>
-    <ds:schemaRef ds:uri="http://www.w3.org/XML/1998/namespace"/>
-    <ds:schemaRef ds:uri="http://schemas.microsoft.com/office/2006/documentManagement/types"/>
-    <ds:schemaRef ds:uri="http://purl.org/dc/terms/"/>
-    <ds:schemaRef ds:uri="http://purl.org/dc/elements/1.1/"/>
-    <ds:schemaRef ds:uri="http://schemas.openxmlformats.org/package/2006/metadata/core-properties"/>
-    <ds:schemaRef ds:uri="http://schemas.microsoft.com/office/infopath/2007/PartnerControls"/>
-    <ds:schemaRef ds:uri="http://schemas.microsoft.com/sharepoint/v3"/>
-    <ds:schemaRef ds:uri="http://schemas.microsoft.com/office/2006/metadata/properties"/>
-    <ds:schemaRef ds:uri="http://purl.org/dc/dcmitype/"/>
-  </ds:schemaRefs>
-</ds:datastoreItem>
-</file>
-
-<file path=customXml/itemProps3.xml><?xml version="1.0" encoding="utf-8"?>
 <ds:datastoreItem xmlns:ds="http://schemas.openxmlformats.org/officeDocument/2006/customXml" ds:itemID="{652D4B87-A129-49B6-A00B-E280DAE4F0D2}">
   <ds:schemaRefs>
     <ds:schemaRef ds:uri="http://schemas.microsoft.com/office/2006/metadata/contentType"/>
@@ -25445,4 +25437,21 @@
     <ds:schemaRef ds:uri="http://schemas.microsoft.com/internal/obd"/>
   </ds:schemaRefs>
 </ds:datastoreItem>
+</file>
+
+<file path=customXml/itemProps3.xml><?xml version="1.0" encoding="utf-8"?>
+<ds:datastoreItem xmlns:ds="http://schemas.openxmlformats.org/officeDocument/2006/customXml" ds:itemID="{47279921-A1B4-472D-B7BD-F638B6892104}">
+  <ds:schemaRefs>
+    <ds:schemaRef ds:uri="b542780c-f3c1-48de-9090-e65480539529"/>
+    <ds:schemaRef ds:uri="http://www.w3.org/XML/1998/namespace"/>
+    <ds:schemaRef ds:uri="http://schemas.microsoft.com/office/2006/documentManagement/types"/>
+    <ds:schemaRef ds:uri="http://purl.org/dc/terms/"/>
+    <ds:schemaRef ds:uri="http://purl.org/dc/elements/1.1/"/>
+    <ds:schemaRef ds:uri="http://schemas.openxmlformats.org/package/2006/metadata/core-properties"/>
+    <ds:schemaRef ds:uri="http://schemas.microsoft.com/office/infopath/2007/PartnerControls"/>
+    <ds:schemaRef ds:uri="http://schemas.microsoft.com/sharepoint/v3"/>
+    <ds:schemaRef ds:uri="http://schemas.microsoft.com/office/2006/metadata/properties"/>
+    <ds:schemaRef ds:uri="http://purl.org/dc/dcmitype/"/>
+  </ds:schemaRefs>
+</ds:datastoreItem>
 </file>
</xml_diff>

<commit_message>
corrected a typo in ggplot code
</commit_message>
<xml_diff>
--- a/wrangling_with_r.pptx
+++ b/wrangling_with_r.pptx
@@ -288,7 +288,7 @@
               <a:pPr>
                 <a:defRPr/>
               </a:pPr>
-              <a:t>4/5/2017</a:t>
+              <a:t>6/28/2017</a:t>
             </a:fld>
             <a:endParaRPr lang="en-US" dirty="0">
               <a:latin typeface="Corbel"/>
@@ -520,7 +520,7 @@
               <a:pPr>
                 <a:defRPr/>
               </a:pPr>
-              <a:t>4/5/2017</a:t>
+              <a:t>6/28/2017</a:t>
             </a:fld>
             <a:endParaRPr lang="en-US" dirty="0"/>
           </a:p>
@@ -10473,14 +10473,14 @@
           </a:ln>
           <a:extLst>
             <a:ext uri="{909E8E84-426E-40dd-AFC4-6F175D3DCCD1}">
-              <a14:hiddenFill xmlns="" xmlns:a14="http://schemas.microsoft.com/office/drawing/2010/main">
+              <a14:hiddenFill xmlns:a14="http://schemas.microsoft.com/office/drawing/2010/main" xmlns="">
                 <a:solidFill>
                   <a:srgbClr val="FFFFFF"/>
                 </a:solidFill>
               </a14:hiddenFill>
             </a:ext>
             <a:ext uri="{91240B29-F687-4f45-9708-019B960494DF}">
-              <a14:hiddenLine xmlns="" xmlns:a14="http://schemas.microsoft.com/office/drawing/2010/main" w="9525">
+              <a14:hiddenLine xmlns:a14="http://schemas.microsoft.com/office/drawing/2010/main" xmlns="" w="9525">
                 <a:solidFill>
                   <a:srgbClr val="000000"/>
                 </a:solidFill>
@@ -10490,7 +10490,7 @@
               </a14:hiddenLine>
             </a:ext>
             <a:ext uri="{FAA26D3D-D897-4be2-8F04-BA451C77F1D7}">
-              <ma14:placeholderFlag xmlns="" xmlns:ma14="http://schemas.microsoft.com/office/mac/drawingml/2011/main" val="1"/>
+              <ma14:placeholderFlag xmlns:ma14="http://schemas.microsoft.com/office/mac/drawingml/2011/main" xmlns="" val="1"/>
             </a:ext>
           </a:extLst>
         </p:spPr>
@@ -13751,7 +13751,7 @@
             <a:effectLst/>
             <a:extLst>
               <a:ext uri="{91240B29-F687-4f45-9708-019B960494DF}">
-                <a14:hiddenLine xmlns="" xmlns:a14="http://schemas.microsoft.com/office/drawing/2010/main" w="9525" cap="flat">
+                <a14:hiddenLine xmlns:a14="http://schemas.microsoft.com/office/drawing/2010/main" xmlns="" w="9525" cap="flat">
                   <a:solidFill>
                     <a:srgbClr val="808080"/>
                   </a:solidFill>
@@ -13761,7 +13761,7 @@
                 </a14:hiddenLine>
               </a:ext>
               <a:ext uri="{AF507438-7753-43e0-B8FC-AC1667EBCBE1}">
-                <a14:hiddenEffects xmlns="" xmlns:a14="http://schemas.microsoft.com/office/drawing/2010/main">
+                <a14:hiddenEffects xmlns:a14="http://schemas.microsoft.com/office/drawing/2010/main" xmlns="">
                   <a:effectLst>
                     <a:outerShdw blurRad="63500" dist="38099" dir="2700000" algn="ctr" rotWithShape="0">
                       <a:srgbClr val="000000">
@@ -13959,7 +13959,7 @@
             <a:effectLst/>
             <a:extLst>
               <a:ext uri="{91240B29-F687-4f45-9708-019B960494DF}">
-                <a14:hiddenLine xmlns="" xmlns:a14="http://schemas.microsoft.com/office/drawing/2010/main" w="9525" cap="flat">
+                <a14:hiddenLine xmlns:a14="http://schemas.microsoft.com/office/drawing/2010/main" xmlns="" w="9525" cap="flat">
                   <a:solidFill>
                     <a:srgbClr val="808080"/>
                   </a:solidFill>
@@ -13969,7 +13969,7 @@
                 </a14:hiddenLine>
               </a:ext>
               <a:ext uri="{AF507438-7753-43e0-B8FC-AC1667EBCBE1}">
-                <a14:hiddenEffects xmlns="" xmlns:a14="http://schemas.microsoft.com/office/drawing/2010/main">
+                <a14:hiddenEffects xmlns:a14="http://schemas.microsoft.com/office/drawing/2010/main" xmlns="">
                   <a:effectLst>
                     <a:outerShdw blurRad="63500" dist="38099" dir="2700000" algn="ctr" rotWithShape="0">
                       <a:srgbClr val="000000">
@@ -14088,7 +14088,7 @@
             <a:effectLst/>
             <a:extLst>
               <a:ext uri="{91240B29-F687-4f45-9708-019B960494DF}">
-                <a14:hiddenLine xmlns="" xmlns:a14="http://schemas.microsoft.com/office/drawing/2010/main" w="9525" cap="flat">
+                <a14:hiddenLine xmlns:a14="http://schemas.microsoft.com/office/drawing/2010/main" xmlns="" w="9525" cap="flat">
                   <a:solidFill>
                     <a:srgbClr val="808080"/>
                   </a:solidFill>
@@ -14098,7 +14098,7 @@
                 </a14:hiddenLine>
               </a:ext>
               <a:ext uri="{AF507438-7753-43e0-B8FC-AC1667EBCBE1}">
-                <a14:hiddenEffects xmlns="" xmlns:a14="http://schemas.microsoft.com/office/drawing/2010/main">
+                <a14:hiddenEffects xmlns:a14="http://schemas.microsoft.com/office/drawing/2010/main" xmlns="">
                   <a:effectLst>
                     <a:outerShdw blurRad="63500" dist="38099" dir="2700000" algn="ctr" rotWithShape="0">
                       <a:srgbClr val="000000">
@@ -14370,7 +14370,7 @@
             <a:effectLst/>
             <a:extLst>
               <a:ext uri="{91240B29-F687-4f45-9708-019B960494DF}">
-                <a14:hiddenLine xmlns="" xmlns:a14="http://schemas.microsoft.com/office/drawing/2010/main" w="9525" cap="flat">
+                <a14:hiddenLine xmlns:a14="http://schemas.microsoft.com/office/drawing/2010/main" xmlns="" w="9525" cap="flat">
                   <a:solidFill>
                     <a:srgbClr val="808080"/>
                   </a:solidFill>
@@ -14380,7 +14380,7 @@
                 </a14:hiddenLine>
               </a:ext>
               <a:ext uri="{AF507438-7753-43e0-B8FC-AC1667EBCBE1}">
-                <a14:hiddenEffects xmlns="" xmlns:a14="http://schemas.microsoft.com/office/drawing/2010/main">
+                <a14:hiddenEffects xmlns:a14="http://schemas.microsoft.com/office/drawing/2010/main" xmlns="">
                   <a:effectLst>
                     <a:outerShdw blurRad="63500" dist="38099" dir="2700000" algn="ctr" rotWithShape="0">
                       <a:srgbClr val="000000">
@@ -14499,7 +14499,7 @@
             <a:effectLst/>
             <a:extLst>
               <a:ext uri="{91240B29-F687-4f45-9708-019B960494DF}">
-                <a14:hiddenLine xmlns="" xmlns:a14="http://schemas.microsoft.com/office/drawing/2010/main" w="9525" cap="flat">
+                <a14:hiddenLine xmlns:a14="http://schemas.microsoft.com/office/drawing/2010/main" xmlns="" w="9525" cap="flat">
                   <a:solidFill>
                     <a:srgbClr val="808080"/>
                   </a:solidFill>
@@ -14509,7 +14509,7 @@
                 </a14:hiddenLine>
               </a:ext>
               <a:ext uri="{AF507438-7753-43e0-B8FC-AC1667EBCBE1}">
-                <a14:hiddenEffects xmlns="" xmlns:a14="http://schemas.microsoft.com/office/drawing/2010/main">
+                <a14:hiddenEffects xmlns:a14="http://schemas.microsoft.com/office/drawing/2010/main" xmlns="">
                   <a:effectLst>
                     <a:outerShdw blurRad="63500" dist="38099" dir="2700000" algn="ctr" rotWithShape="0">
                       <a:srgbClr val="000000">
@@ -14695,7 +14695,7 @@
             <a:effectLst/>
             <a:extLst>
               <a:ext uri="{91240B29-F687-4f45-9708-019B960494DF}">
-                <a14:hiddenLine xmlns="" xmlns:a14="http://schemas.microsoft.com/office/drawing/2010/main" w="9525" cap="flat">
+                <a14:hiddenLine xmlns:a14="http://schemas.microsoft.com/office/drawing/2010/main" xmlns="" w="9525" cap="flat">
                   <a:solidFill>
                     <a:srgbClr val="808080"/>
                   </a:solidFill>
@@ -14705,7 +14705,7 @@
                 </a14:hiddenLine>
               </a:ext>
               <a:ext uri="{AF507438-7753-43e0-B8FC-AC1667EBCBE1}">
-                <a14:hiddenEffects xmlns="" xmlns:a14="http://schemas.microsoft.com/office/drawing/2010/main">
+                <a14:hiddenEffects xmlns:a14="http://schemas.microsoft.com/office/drawing/2010/main" xmlns="">
                   <a:effectLst>
                     <a:outerShdw blurRad="63500" dist="38099" dir="2700000" algn="ctr" rotWithShape="0">
                       <a:srgbClr val="000000">
@@ -14931,7 +14931,7 @@
             <a:effectLst/>
             <a:extLst>
               <a:ext uri="{91240B29-F687-4f45-9708-019B960494DF}">
-                <a14:hiddenLine xmlns="" xmlns:a14="http://schemas.microsoft.com/office/drawing/2010/main" w="9525" cap="flat">
+                <a14:hiddenLine xmlns:a14="http://schemas.microsoft.com/office/drawing/2010/main" xmlns="" w="9525" cap="flat">
                   <a:solidFill>
                     <a:srgbClr val="808080"/>
                   </a:solidFill>
@@ -14941,7 +14941,7 @@
                 </a14:hiddenLine>
               </a:ext>
               <a:ext uri="{AF507438-7753-43e0-B8FC-AC1667EBCBE1}">
-                <a14:hiddenEffects xmlns="" xmlns:a14="http://schemas.microsoft.com/office/drawing/2010/main">
+                <a14:hiddenEffects xmlns:a14="http://schemas.microsoft.com/office/drawing/2010/main" xmlns="">
                   <a:effectLst>
                     <a:outerShdw blurRad="63500" dist="38099" dir="2700000" algn="ctr" rotWithShape="0">
                       <a:srgbClr val="000000">
@@ -15079,7 +15079,7 @@
             <a:effectLst/>
             <a:extLst>
               <a:ext uri="{91240B29-F687-4f45-9708-019B960494DF}">
-                <a14:hiddenLine xmlns="" xmlns:a14="http://schemas.microsoft.com/office/drawing/2010/main" w="9525" cap="flat">
+                <a14:hiddenLine xmlns:a14="http://schemas.microsoft.com/office/drawing/2010/main" xmlns="" w="9525" cap="flat">
                   <a:solidFill>
                     <a:srgbClr val="808080"/>
                   </a:solidFill>
@@ -15089,7 +15089,7 @@
                 </a14:hiddenLine>
               </a:ext>
               <a:ext uri="{AF507438-7753-43e0-B8FC-AC1667EBCBE1}">
-                <a14:hiddenEffects xmlns="" xmlns:a14="http://schemas.microsoft.com/office/drawing/2010/main">
+                <a14:hiddenEffects xmlns:a14="http://schemas.microsoft.com/office/drawing/2010/main" xmlns="">
                   <a:effectLst>
                     <a:outerShdw blurRad="63500" dist="38099" dir="2700000" algn="ctr" rotWithShape="0">
                       <a:srgbClr val="000000">
@@ -15375,7 +15375,7 @@
             <a:effectLst/>
             <a:extLst>
               <a:ext uri="{91240B29-F687-4f45-9708-019B960494DF}">
-                <a14:hiddenLine xmlns="" xmlns:a14="http://schemas.microsoft.com/office/drawing/2010/main" w="9525" cap="flat">
+                <a14:hiddenLine xmlns:a14="http://schemas.microsoft.com/office/drawing/2010/main" xmlns="" w="9525" cap="flat">
                   <a:solidFill>
                     <a:srgbClr val="808080"/>
                   </a:solidFill>
@@ -15385,7 +15385,7 @@
                 </a14:hiddenLine>
               </a:ext>
               <a:ext uri="{AF507438-7753-43e0-B8FC-AC1667EBCBE1}">
-                <a14:hiddenEffects xmlns="" xmlns:a14="http://schemas.microsoft.com/office/drawing/2010/main">
+                <a14:hiddenEffects xmlns:a14="http://schemas.microsoft.com/office/drawing/2010/main" xmlns="">
                   <a:effectLst>
                     <a:outerShdw blurRad="63500" dist="38099" dir="2700000" algn="ctr" rotWithShape="0">
                       <a:srgbClr val="000000">
@@ -15623,7 +15623,7 @@
             <a:effectLst/>
             <a:extLst>
               <a:ext uri="{91240B29-F687-4f45-9708-019B960494DF}">
-                <a14:hiddenLine xmlns="" xmlns:a14="http://schemas.microsoft.com/office/drawing/2010/main" w="9525" cap="flat">
+                <a14:hiddenLine xmlns:a14="http://schemas.microsoft.com/office/drawing/2010/main" xmlns="" w="9525" cap="flat">
                   <a:solidFill>
                     <a:srgbClr val="808080"/>
                   </a:solidFill>
@@ -15633,7 +15633,7 @@
                 </a14:hiddenLine>
               </a:ext>
               <a:ext uri="{AF507438-7753-43e0-B8FC-AC1667EBCBE1}">
-                <a14:hiddenEffects xmlns="" xmlns:a14="http://schemas.microsoft.com/office/drawing/2010/main">
+                <a14:hiddenEffects xmlns:a14="http://schemas.microsoft.com/office/drawing/2010/main" xmlns="">
                   <a:effectLst>
                     <a:outerShdw blurRad="63500" dist="38099" dir="2700000" algn="ctr" rotWithShape="0">
                       <a:srgbClr val="000000">
@@ -15819,7 +15819,7 @@
             <a:effectLst/>
             <a:extLst>
               <a:ext uri="{91240B29-F687-4f45-9708-019B960494DF}">
-                <a14:hiddenLine xmlns="" xmlns:a14="http://schemas.microsoft.com/office/drawing/2010/main" w="9525" cap="flat">
+                <a14:hiddenLine xmlns:a14="http://schemas.microsoft.com/office/drawing/2010/main" xmlns="" w="9525" cap="flat">
                   <a:solidFill>
                     <a:srgbClr val="808080"/>
                   </a:solidFill>
@@ -15829,7 +15829,7 @@
                 </a14:hiddenLine>
               </a:ext>
               <a:ext uri="{AF507438-7753-43e0-B8FC-AC1667EBCBE1}">
-                <a14:hiddenEffects xmlns="" xmlns:a14="http://schemas.microsoft.com/office/drawing/2010/main">
+                <a14:hiddenEffects xmlns:a14="http://schemas.microsoft.com/office/drawing/2010/main" xmlns="">
                   <a:effectLst>
                     <a:outerShdw blurRad="63500" dist="38099" dir="2700000" algn="ctr" rotWithShape="0">
                       <a:srgbClr val="000000">
@@ -15957,7 +15957,7 @@
             <a:effectLst/>
             <a:extLst>
               <a:ext uri="{91240B29-F687-4f45-9708-019B960494DF}">
-                <a14:hiddenLine xmlns="" xmlns:a14="http://schemas.microsoft.com/office/drawing/2010/main" w="9525" cap="flat">
+                <a14:hiddenLine xmlns:a14="http://schemas.microsoft.com/office/drawing/2010/main" xmlns="" w="9525" cap="flat">
                   <a:solidFill>
                     <a:srgbClr val="808080"/>
                   </a:solidFill>
@@ -15967,7 +15967,7 @@
                 </a14:hiddenLine>
               </a:ext>
               <a:ext uri="{AF507438-7753-43e0-B8FC-AC1667EBCBE1}">
-                <a14:hiddenEffects xmlns="" xmlns:a14="http://schemas.microsoft.com/office/drawing/2010/main">
+                <a14:hiddenEffects xmlns:a14="http://schemas.microsoft.com/office/drawing/2010/main" xmlns="">
                   <a:effectLst>
                     <a:outerShdw blurRad="63500" dist="38099" dir="2700000" algn="ctr" rotWithShape="0">
                       <a:srgbClr val="000000">
@@ -16086,7 +16086,7 @@
             <a:effectLst/>
             <a:extLst>
               <a:ext uri="{91240B29-F687-4f45-9708-019B960494DF}">
-                <a14:hiddenLine xmlns="" xmlns:a14="http://schemas.microsoft.com/office/drawing/2010/main" w="9525" cap="flat">
+                <a14:hiddenLine xmlns:a14="http://schemas.microsoft.com/office/drawing/2010/main" xmlns="" w="9525" cap="flat">
                   <a:solidFill>
                     <a:srgbClr val="808080"/>
                   </a:solidFill>
@@ -16096,7 +16096,7 @@
                 </a14:hiddenLine>
               </a:ext>
               <a:ext uri="{AF507438-7753-43e0-B8FC-AC1667EBCBE1}">
-                <a14:hiddenEffects xmlns="" xmlns:a14="http://schemas.microsoft.com/office/drawing/2010/main">
+                <a14:hiddenEffects xmlns:a14="http://schemas.microsoft.com/office/drawing/2010/main" xmlns="">
                   <a:effectLst>
                     <a:outerShdw blurRad="63500" dist="38099" dir="2700000" algn="ctr" rotWithShape="0">
                       <a:srgbClr val="000000">
@@ -16242,7 +16242,7 @@
             <a:effectLst/>
             <a:extLst>
               <a:ext uri="{91240B29-F687-4f45-9708-019B960494DF}">
-                <a14:hiddenLine xmlns="" xmlns:a14="http://schemas.microsoft.com/office/drawing/2010/main" w="9525" cap="flat">
+                <a14:hiddenLine xmlns:a14="http://schemas.microsoft.com/office/drawing/2010/main" xmlns="" w="9525" cap="flat">
                   <a:solidFill>
                     <a:srgbClr val="808080"/>
                   </a:solidFill>
@@ -16252,7 +16252,7 @@
                 </a14:hiddenLine>
               </a:ext>
               <a:ext uri="{AF507438-7753-43e0-B8FC-AC1667EBCBE1}">
-                <a14:hiddenEffects xmlns="" xmlns:a14="http://schemas.microsoft.com/office/drawing/2010/main">
+                <a14:hiddenEffects xmlns:a14="http://schemas.microsoft.com/office/drawing/2010/main" xmlns="">
                   <a:effectLst>
                     <a:outerShdw blurRad="63500" dist="38099" dir="2700000" algn="ctr" rotWithShape="0">
                       <a:srgbClr val="000000">
@@ -16432,7 +16432,7 @@
             <a:effectLst/>
             <a:extLst>
               <a:ext uri="{91240B29-F687-4f45-9708-019B960494DF}">
-                <a14:hiddenLine xmlns="" xmlns:a14="http://schemas.microsoft.com/office/drawing/2010/main" w="9525" cap="flat">
+                <a14:hiddenLine xmlns:a14="http://schemas.microsoft.com/office/drawing/2010/main" xmlns="" w="9525" cap="flat">
                   <a:solidFill>
                     <a:srgbClr val="808080"/>
                   </a:solidFill>
@@ -16442,7 +16442,7 @@
                 </a14:hiddenLine>
               </a:ext>
               <a:ext uri="{AF507438-7753-43e0-B8FC-AC1667EBCBE1}">
-                <a14:hiddenEffects xmlns="" xmlns:a14="http://schemas.microsoft.com/office/drawing/2010/main">
+                <a14:hiddenEffects xmlns:a14="http://schemas.microsoft.com/office/drawing/2010/main" xmlns="">
                   <a:effectLst>
                     <a:outerShdw blurRad="63500" dist="38099" dir="2700000" algn="ctr" rotWithShape="0">
                       <a:srgbClr val="000000">
@@ -19916,14 +19916,14 @@
           </a:ln>
           <a:extLst>
             <a:ext uri="{909E8E84-426E-40dd-AFC4-6F175D3DCCD1}">
-              <a14:hiddenFill xmlns="" xmlns:a14="http://schemas.microsoft.com/office/drawing/2010/main">
+              <a14:hiddenFill xmlns:a14="http://schemas.microsoft.com/office/drawing/2010/main" xmlns="">
                 <a:solidFill>
                   <a:srgbClr val="FFFFFF"/>
                 </a:solidFill>
               </a14:hiddenFill>
             </a:ext>
             <a:ext uri="{91240B29-F687-4f45-9708-019B960494DF}">
-              <a14:hiddenLine xmlns="" xmlns:a14="http://schemas.microsoft.com/office/drawing/2010/main" w="9525">
+              <a14:hiddenLine xmlns:a14="http://schemas.microsoft.com/office/drawing/2010/main" xmlns="" w="9525">
                 <a:solidFill>
                   <a:srgbClr val="000000"/>
                 </a:solidFill>
@@ -19933,7 +19933,7 @@
               </a14:hiddenLine>
             </a:ext>
             <a:ext uri="{FAA26D3D-D897-4be2-8F04-BA451C77F1D7}">
-              <ma14:placeholderFlag xmlns="" xmlns:ma14="http://schemas.microsoft.com/office/mac/drawingml/2011/main" val="1"/>
+              <ma14:placeholderFlag xmlns:ma14="http://schemas.microsoft.com/office/mac/drawingml/2011/main" xmlns="" val="1"/>
             </a:ext>
           </a:extLst>
         </p:spPr>
@@ -19978,14 +19978,14 @@
           </a:ln>
           <a:extLst>
             <a:ext uri="{909E8E84-426E-40dd-AFC4-6F175D3DCCD1}">
-              <a14:hiddenFill xmlns="" xmlns:a14="http://schemas.microsoft.com/office/drawing/2010/main">
+              <a14:hiddenFill xmlns:a14="http://schemas.microsoft.com/office/drawing/2010/main" xmlns="">
                 <a:solidFill>
                   <a:srgbClr val="FFFFFF"/>
                 </a:solidFill>
               </a14:hiddenFill>
             </a:ext>
             <a:ext uri="{91240B29-F687-4f45-9708-019B960494DF}">
-              <a14:hiddenLine xmlns="" xmlns:a14="http://schemas.microsoft.com/office/drawing/2010/main" w="9525">
+              <a14:hiddenLine xmlns:a14="http://schemas.microsoft.com/office/drawing/2010/main" xmlns="" w="9525">
                 <a:solidFill>
                   <a:srgbClr val="000000"/>
                 </a:solidFill>
@@ -19995,7 +19995,7 @@
               </a14:hiddenLine>
             </a:ext>
             <a:ext uri="{FAA26D3D-D897-4be2-8F04-BA451C77F1D7}">
-              <ma14:placeholderFlag xmlns="" xmlns:ma14="http://schemas.microsoft.com/office/mac/drawingml/2011/main" val="1"/>
+              <ma14:placeholderFlag xmlns:ma14="http://schemas.microsoft.com/office/mac/drawingml/2011/main" xmlns="" val="1"/>
             </a:ext>
           </a:extLst>
         </p:spPr>
@@ -21935,6 +21935,13 @@
   <p:clrMapOvr>
     <a:masterClrMapping/>
   </p:clrMapOvr>
+  <p:timing>
+    <p:tnLst>
+      <p:par>
+        <p:cTn id="1" dur="indefinite" restart="never" nodeType="tmRoot"/>
+      </p:par>
+    </p:tnLst>
+  </p:timing>
 </p:sld>
 </file>
 
@@ -22171,6 +22178,13 @@
   <p:clrMapOvr>
     <a:masterClrMapping/>
   </p:clrMapOvr>
+  <p:timing>
+    <p:tnLst>
+      <p:par>
+        <p:cTn id="1" dur="indefinite" restart="never" nodeType="tmRoot"/>
+      </p:par>
+    </p:tnLst>
+  </p:timing>
 </p:sld>
 </file>
 
@@ -22295,11 +22309,7 @@
             </a:br>
             <a:r>
               <a:rPr lang="en-US" i="1"/>
-              <a:t>firstfun(x) </a:t>
-            </a:r>
-            <a:r>
-              <a:rPr lang="en-US" i="1"/>
-              <a:t>%&gt;% </a:t>
+              <a:t>firstfun(x) %&gt;% </a:t>
             </a:r>
             <a:r>
               <a:rPr lang="en-US" i="1" smtClean="0"/>
@@ -22381,6 +22391,13 @@
   <p:clrMapOvr>
     <a:masterClrMapping/>
   </p:clrMapOvr>
+  <p:timing>
+    <p:tnLst>
+      <p:par>
+        <p:cTn id="1" dur="indefinite" restart="never" nodeType="tmRoot"/>
+      </p:par>
+    </p:tnLst>
+  </p:timing>
 </p:sld>
 </file>
 
@@ -22807,6 +22824,13 @@
   <p:clrMapOvr>
     <a:masterClrMapping/>
   </p:clrMapOvr>
+  <p:timing>
+    <p:tnLst>
+      <p:par>
+        <p:cTn id="1" dur="indefinite" restart="never" nodeType="tmRoot"/>
+      </p:par>
+    </p:tnLst>
+  </p:timing>
 </p:sld>
 </file>
 
@@ -22909,6 +22933,13 @@
   <p:clrMapOvr>
     <a:masterClrMapping/>
   </p:clrMapOvr>
+  <p:timing>
+    <p:tnLst>
+      <p:par>
+        <p:cTn id="1" dur="indefinite" restart="never" nodeType="tmRoot"/>
+      </p:par>
+    </p:tnLst>
+  </p:timing>
 </p:sld>
 </file>
 
@@ -23057,6 +23088,13 @@
   <p:clrMapOvr>
     <a:masterClrMapping/>
   </p:clrMapOvr>
+  <p:timing>
+    <p:tnLst>
+      <p:par>
+        <p:cTn id="1" dur="indefinite" restart="never" nodeType="tmRoot"/>
+      </p:par>
+    </p:tnLst>
+  </p:timing>
 </p:sld>
 </file>
 
@@ -23155,11 +23193,7 @@
             </a:r>
             <a:r>
               <a:rPr lang="en-US" smtClean="0"/>
-              <a:t>: </a:t>
-            </a:r>
-            <a:r>
-              <a:rPr lang="en-US" smtClean="0"/>
-              <a:t>plots, help, file viewer, package viewer</a:t>
+              <a:t>: plots, help, file viewer, package viewer</a:t>
             </a:r>
             <a:endParaRPr lang="en-US" dirty="0" smtClean="0"/>
           </a:p>
@@ -23251,6 +23285,13 @@
   <p:clrMapOvr>
     <a:masterClrMapping/>
   </p:clrMapOvr>
+  <p:timing>
+    <p:tnLst>
+      <p:par>
+        <p:cTn id="1" dur="indefinite" restart="never" nodeType="tmRoot"/>
+      </p:par>
+    </p:tnLst>
+  </p:timing>
 </p:sld>
 </file>
 
@@ -23382,11 +23423,7 @@
             </a:r>
             <a:r>
               <a:rPr lang="en-US" smtClean="0"/>
-              <a:t>every </a:t>
-            </a:r>
-            <a:r>
-              <a:rPr lang="en-US" smtClean="0"/>
-              <a:t>time</a:t>
+              <a:t>every time</a:t>
             </a:r>
           </a:p>
           <a:p>
@@ -23464,6 +23501,13 @@
   <p:clrMapOvr>
     <a:masterClrMapping/>
   </p:clrMapOvr>
+  <p:timing>
+    <p:tnLst>
+      <p:par>
+        <p:cTn id="1" dur="indefinite" restart="never" nodeType="tmRoot"/>
+      </p:par>
+    </p:tnLst>
+  </p:timing>
 </p:sld>
 </file>
 
@@ -23637,6 +23681,13 @@
   <p:clrMapOvr>
     <a:masterClrMapping/>
   </p:clrMapOvr>
+  <p:timing>
+    <p:tnLst>
+      <p:par>
+        <p:cTn id="1" dur="indefinite" restart="never" nodeType="tmRoot"/>
+      </p:par>
+    </p:tnLst>
+  </p:timing>
 </p:sld>
 </file>
 
@@ -23902,6 +23953,13 @@
   <p:clrMapOvr>
     <a:masterClrMapping/>
   </p:clrMapOvr>
+  <p:timing>
+    <p:tnLst>
+      <p:par>
+        <p:cTn id="1" dur="indefinite" restart="never" nodeType="tmRoot"/>
+      </p:par>
+    </p:tnLst>
+  </p:timing>
 </p:sld>
 </file>
 
@@ -23975,11 +24033,7 @@
           <a:p>
             <a:r>
               <a:rPr lang="en-US" smtClean="0"/>
-              <a:t>You can make several choices on the wizard, about delimiters, encoding, etc</a:t>
-            </a:r>
-            <a:r>
-              <a:rPr lang="en-US" smtClean="0"/>
-              <a:t>.</a:t>
+              <a:t>You can make several choices on the wizard, about delimiters, encoding, etc.</a:t>
             </a:r>
           </a:p>
           <a:p>
@@ -24003,47 +24057,18 @@
               <a:rPr lang="en-US" smtClean="0"/>
               <a:t>things like row names will be a problem </a:t>
             </a:r>
-            <a:endParaRPr lang="en-US" smtClean="0"/>
           </a:p>
           <a:p>
             <a:r>
               <a:rPr lang="en-US" smtClean="0"/>
-              <a:t>the </a:t>
-            </a:r>
+              <a:t>the wizard creates a piece of code that will actually do the importing</a:t>
+            </a:r>
+          </a:p>
+          <a:p>
+            <a:pPr lvl="1"/>
             <a:r>
               <a:rPr lang="en-US" smtClean="0"/>
-              <a:t>wizard creates </a:t>
-            </a:r>
-            <a:r>
-              <a:rPr lang="en-US" smtClean="0"/>
-              <a:t>a piece of code that </a:t>
-            </a:r>
-            <a:r>
-              <a:rPr lang="en-US" smtClean="0"/>
-              <a:t>will actually do the importing</a:t>
-            </a:r>
-          </a:p>
-          <a:p>
-            <a:pPr lvl="1"/>
-            <a:r>
-              <a:rPr lang="en-US" smtClean="0"/>
-              <a:t>you </a:t>
-            </a:r>
-            <a:r>
-              <a:rPr lang="en-US" smtClean="0"/>
-              <a:t>might want to </a:t>
-            </a:r>
-            <a:r>
-              <a:rPr lang="en-US" smtClean="0"/>
-              <a:t>save, edit and rerun it in </a:t>
-            </a:r>
-            <a:r>
-              <a:rPr lang="en-US" smtClean="0"/>
-              <a:t>your </a:t>
-            </a:r>
-            <a:r>
-              <a:rPr lang="en-US" smtClean="0"/>
-              <a:t>script</a:t>
+              <a:t>you might want to save, edit and rerun it in your script</a:t>
             </a:r>
             <a:endParaRPr lang="en-US"/>
           </a:p>
@@ -24206,7 +24231,6 @@
               <a:rPr lang="en-US" smtClean="0"/>
               <a:t>ggplot(iris)+</a:t>
             </a:r>
-            <a:endParaRPr lang="en-US" smtClean="0"/>
           </a:p>
           <a:p>
             <a:pPr marL="349200" lvl="1" indent="0">
@@ -24214,11 +24238,11 @@
             </a:pPr>
             <a:r>
               <a:rPr lang="en-US" smtClean="0"/>
-              <a:t>geom_points(aes(x=Sepal.Width, y=Sepal.Length, col=Species</a:t>
+              <a:t>geom_point(aes(x=Sepal.Width</a:t>
             </a:r>
             <a:r>
               <a:rPr lang="en-US" smtClean="0"/>
-              <a:t>))</a:t>
+              <a:t>, y=Sepal.Length, col=Species))</a:t>
             </a:r>
             <a:endParaRPr lang="en-US"/>
           </a:p>
@@ -24229,11 +24253,7 @@
             </a:r>
             <a:r>
               <a:rPr lang="en-US"/>
-              <a:t>set. And I want there to </a:t>
-            </a:r>
-            <a:r>
-              <a:rPr lang="en-US"/>
-              <a:t>be </a:t>
+              <a:t>set. And I want there to be </a:t>
             </a:r>
             <a:r>
               <a:rPr lang="en-US" smtClean="0"/>
@@ -24245,27 +24265,7 @@
             </a:r>
             <a:r>
               <a:rPr lang="en-US" smtClean="0"/>
-              <a:t>that Sepal.Width maps </a:t>
-            </a:r>
-            <a:r>
-              <a:rPr lang="en-US" smtClean="0"/>
-              <a:t>to their </a:t>
-            </a:r>
-            <a:r>
-              <a:rPr lang="en-US" smtClean="0"/>
-              <a:t>x </a:t>
-            </a:r>
-            <a:r>
-              <a:rPr lang="en-US" smtClean="0"/>
-              <a:t>coord., Sepal.Length </a:t>
-            </a:r>
-            <a:r>
-              <a:rPr lang="en-US" smtClean="0"/>
-              <a:t>to y </a:t>
-            </a:r>
-            <a:r>
-              <a:rPr lang="en-US" smtClean="0"/>
-              <a:t>coord., and Species to their color."</a:t>
+              <a:t>that Sepal.Width maps to their x coord., Sepal.Length to y coord., and Species to their color."</a:t>
             </a:r>
           </a:p>
           <a:p>
@@ -24400,11 +24400,7 @@
             </a:r>
             <a:r>
               <a:rPr lang="en-US" smtClean="0"/>
-              <a:t>ilter, </a:t>
-            </a:r>
-            <a:r>
-              <a:rPr lang="en-US" smtClean="0"/>
-              <a:t>arrange, select</a:t>
+              <a:t>ilter, arrange, select</a:t>
             </a:r>
             <a:endParaRPr lang="en-US"/>
           </a:p>
@@ -24473,11 +24469,7 @@
             </a:r>
             <a:r>
               <a:rPr lang="en-US"/>
-              <a:t> is the function for arranging rows according to values of </a:t>
-            </a:r>
-            <a:r>
-              <a:rPr lang="en-US"/>
-              <a:t>a </a:t>
+              <a:t> is the function for arranging rows according to values of a </a:t>
             </a:r>
             <a:r>
               <a:rPr lang="en-US" smtClean="0"/>
@@ -24507,11 +24499,7 @@
             </a:r>
             <a:r>
               <a:rPr lang="en-US" smtClean="0"/>
-              <a:t>helper </a:t>
-            </a:r>
-            <a:r>
-              <a:rPr lang="en-US" smtClean="0"/>
-              <a:t>functions</a:t>
+              <a:t>helper functions</a:t>
             </a:r>
             <a:endParaRPr lang="en-US" dirty="0" smtClean="0"/>
           </a:p>
@@ -25519,6 +25507,15 @@
 </file>
 
 <file path=customXml/item1.xml><?xml version="1.0" encoding="utf-8"?>
+<?mso-contentType ?>
+<FormTemplates xmlns="http://schemas.microsoft.com/sharepoint/v3/contenttype/forms">
+  <Display>DocumentLibraryForm</Display>
+  <Edit>DocumentLibraryForm</Edit>
+  <New>DocumentLibraryForm</New>
+</FormTemplates>
+</file>
+
+<file path=customXml/item2.xml><?xml version="1.0" encoding="utf-8"?>
 <p:properties xmlns:p="http://schemas.microsoft.com/office/2006/metadata/properties" xmlns:xsi="http://www.w3.org/2001/XMLSchema-instance" xmlns:pc="http://schemas.microsoft.com/office/infopath/2007/PartnerControls">
   <documentManagement>
     <PublishingRollupImage xmlns="http://schemas.microsoft.com/sharepoint/v3" xsi:nil="true"/>
@@ -25562,15 +25559,6 @@
 Version 04.11.2016/Marketing and Communications</Comments>
   </documentManagement>
 </p:properties>
-</file>
-
-<file path=customXml/item2.xml><?xml version="1.0" encoding="utf-8"?>
-<?mso-contentType ?>
-<FormTemplates xmlns="http://schemas.microsoft.com/sharepoint/v3/contenttype/forms">
-  <Display>DocumentLibraryForm</Display>
-  <Edit>DocumentLibraryForm</Edit>
-  <New>DocumentLibraryForm</New>
-</FormTemplates>
 </file>
 
 <file path=customXml/item3.xml><?xml version="1.0" encoding="utf-8"?>
@@ -25951,6 +25939,14 @@
 </file>
 
 <file path=customXml/itemProps1.xml><?xml version="1.0" encoding="utf-8"?>
+<ds:datastoreItem xmlns:ds="http://schemas.openxmlformats.org/officeDocument/2006/customXml" ds:itemID="{D4C4CBFC-2EF1-4092-8F2F-5A5B86A85C2F}">
+  <ds:schemaRefs>
+    <ds:schemaRef ds:uri="http://schemas.microsoft.com/sharepoint/v3/contenttype/forms"/>
+  </ds:schemaRefs>
+</ds:datastoreItem>
+</file>
+
+<file path=customXml/itemProps2.xml><?xml version="1.0" encoding="utf-8"?>
 <ds:datastoreItem xmlns:ds="http://schemas.openxmlformats.org/officeDocument/2006/customXml" ds:itemID="{47279921-A1B4-472D-B7BD-F638B6892104}">
   <ds:schemaRefs>
     <ds:schemaRef ds:uri="b542780c-f3c1-48de-9090-e65480539529"/>
@@ -25963,14 +25959,6 @@
     <ds:schemaRef ds:uri="http://schemas.microsoft.com/sharepoint/v3"/>
     <ds:schemaRef ds:uri="http://schemas.microsoft.com/office/2006/metadata/properties"/>
     <ds:schemaRef ds:uri="http://purl.org/dc/dcmitype/"/>
-  </ds:schemaRefs>
-</ds:datastoreItem>
-</file>
-
-<file path=customXml/itemProps2.xml><?xml version="1.0" encoding="utf-8"?>
-<ds:datastoreItem xmlns:ds="http://schemas.openxmlformats.org/officeDocument/2006/customXml" ds:itemID="{D4C4CBFC-2EF1-4092-8F2F-5A5B86A85C2F}">
-  <ds:schemaRefs>
-    <ds:schemaRef ds:uri="http://schemas.microsoft.com/sharepoint/v3/contenttype/forms"/>
   </ds:schemaRefs>
 </ds:datastoreItem>
 </file>

</xml_diff>

<commit_message>
corrected typo in ex. numbers
</commit_message>
<xml_diff>
--- a/wrangling_with_r.pptx
+++ b/wrangling_with_r.pptx
@@ -308,7 +308,7 @@
               <a:pPr>
                 <a:defRPr/>
               </a:pPr>
-              <a:t>2/4/2018</a:t>
+              <a:t>2/6/2018</a:t>
             </a:fld>
             <a:endParaRPr lang="en-US" dirty="0">
               <a:latin typeface="Corbel"/>
@@ -540,7 +540,7 @@
               <a:pPr>
                 <a:defRPr/>
               </a:pPr>
-              <a:t>2/4/2018</a:t>
+              <a:t>2/6/2018</a:t>
             </a:fld>
             <a:endParaRPr lang="en-US" dirty="0"/>
           </a:p>
@@ -10583,14 +10583,14 @@
           </a:ln>
           <a:extLst>
             <a:ext uri="{909E8E84-426E-40dd-AFC4-6F175D3DCCD1}">
-              <a14:hiddenFill xmlns:a14="http://schemas.microsoft.com/office/drawing/2010/main" xmlns="">
+              <a14:hiddenFill xmlns="" xmlns:a14="http://schemas.microsoft.com/office/drawing/2010/main">
                 <a:solidFill>
                   <a:srgbClr val="FFFFFF"/>
                 </a:solidFill>
               </a14:hiddenFill>
             </a:ext>
             <a:ext uri="{91240B29-F687-4f45-9708-019B960494DF}">
-              <a14:hiddenLine xmlns:a14="http://schemas.microsoft.com/office/drawing/2010/main" xmlns="" w="9525">
+              <a14:hiddenLine xmlns="" xmlns:a14="http://schemas.microsoft.com/office/drawing/2010/main" w="9525">
                 <a:solidFill>
                   <a:srgbClr val="000000"/>
                 </a:solidFill>
@@ -10600,7 +10600,7 @@
               </a14:hiddenLine>
             </a:ext>
             <a:ext uri="{FAA26D3D-D897-4be2-8F04-BA451C77F1D7}">
-              <ma14:placeholderFlag xmlns:ma14="http://schemas.microsoft.com/office/mac/drawingml/2011/main" xmlns="" val="1"/>
+              <ma14:placeholderFlag xmlns="" xmlns:ma14="http://schemas.microsoft.com/office/mac/drawingml/2011/main" val="1"/>
             </a:ext>
           </a:extLst>
         </p:spPr>
@@ -13861,7 +13861,7 @@
             <a:effectLst/>
             <a:extLst>
               <a:ext uri="{91240B29-F687-4f45-9708-019B960494DF}">
-                <a14:hiddenLine xmlns:a14="http://schemas.microsoft.com/office/drawing/2010/main" xmlns="" w="9525" cap="flat">
+                <a14:hiddenLine xmlns="" xmlns:a14="http://schemas.microsoft.com/office/drawing/2010/main" w="9525" cap="flat">
                   <a:solidFill>
                     <a:srgbClr val="808080"/>
                   </a:solidFill>
@@ -13871,7 +13871,7 @@
                 </a14:hiddenLine>
               </a:ext>
               <a:ext uri="{AF507438-7753-43e0-B8FC-AC1667EBCBE1}">
-                <a14:hiddenEffects xmlns:a14="http://schemas.microsoft.com/office/drawing/2010/main" xmlns="">
+                <a14:hiddenEffects xmlns="" xmlns:a14="http://schemas.microsoft.com/office/drawing/2010/main">
                   <a:effectLst>
                     <a:outerShdw blurRad="63500" dist="38099" dir="2700000" algn="ctr" rotWithShape="0">
                       <a:srgbClr val="000000">
@@ -14069,7 +14069,7 @@
             <a:effectLst/>
             <a:extLst>
               <a:ext uri="{91240B29-F687-4f45-9708-019B960494DF}">
-                <a14:hiddenLine xmlns:a14="http://schemas.microsoft.com/office/drawing/2010/main" xmlns="" w="9525" cap="flat">
+                <a14:hiddenLine xmlns="" xmlns:a14="http://schemas.microsoft.com/office/drawing/2010/main" w="9525" cap="flat">
                   <a:solidFill>
                     <a:srgbClr val="808080"/>
                   </a:solidFill>
@@ -14079,7 +14079,7 @@
                 </a14:hiddenLine>
               </a:ext>
               <a:ext uri="{AF507438-7753-43e0-B8FC-AC1667EBCBE1}">
-                <a14:hiddenEffects xmlns:a14="http://schemas.microsoft.com/office/drawing/2010/main" xmlns="">
+                <a14:hiddenEffects xmlns="" xmlns:a14="http://schemas.microsoft.com/office/drawing/2010/main">
                   <a:effectLst>
                     <a:outerShdw blurRad="63500" dist="38099" dir="2700000" algn="ctr" rotWithShape="0">
                       <a:srgbClr val="000000">
@@ -14198,7 +14198,7 @@
             <a:effectLst/>
             <a:extLst>
               <a:ext uri="{91240B29-F687-4f45-9708-019B960494DF}">
-                <a14:hiddenLine xmlns:a14="http://schemas.microsoft.com/office/drawing/2010/main" xmlns="" w="9525" cap="flat">
+                <a14:hiddenLine xmlns="" xmlns:a14="http://schemas.microsoft.com/office/drawing/2010/main" w="9525" cap="flat">
                   <a:solidFill>
                     <a:srgbClr val="808080"/>
                   </a:solidFill>
@@ -14208,7 +14208,7 @@
                 </a14:hiddenLine>
               </a:ext>
               <a:ext uri="{AF507438-7753-43e0-B8FC-AC1667EBCBE1}">
-                <a14:hiddenEffects xmlns:a14="http://schemas.microsoft.com/office/drawing/2010/main" xmlns="">
+                <a14:hiddenEffects xmlns="" xmlns:a14="http://schemas.microsoft.com/office/drawing/2010/main">
                   <a:effectLst>
                     <a:outerShdw blurRad="63500" dist="38099" dir="2700000" algn="ctr" rotWithShape="0">
                       <a:srgbClr val="000000">
@@ -14480,7 +14480,7 @@
             <a:effectLst/>
             <a:extLst>
               <a:ext uri="{91240B29-F687-4f45-9708-019B960494DF}">
-                <a14:hiddenLine xmlns:a14="http://schemas.microsoft.com/office/drawing/2010/main" xmlns="" w="9525" cap="flat">
+                <a14:hiddenLine xmlns="" xmlns:a14="http://schemas.microsoft.com/office/drawing/2010/main" w="9525" cap="flat">
                   <a:solidFill>
                     <a:srgbClr val="808080"/>
                   </a:solidFill>
@@ -14490,7 +14490,7 @@
                 </a14:hiddenLine>
               </a:ext>
               <a:ext uri="{AF507438-7753-43e0-B8FC-AC1667EBCBE1}">
-                <a14:hiddenEffects xmlns:a14="http://schemas.microsoft.com/office/drawing/2010/main" xmlns="">
+                <a14:hiddenEffects xmlns="" xmlns:a14="http://schemas.microsoft.com/office/drawing/2010/main">
                   <a:effectLst>
                     <a:outerShdw blurRad="63500" dist="38099" dir="2700000" algn="ctr" rotWithShape="0">
                       <a:srgbClr val="000000">
@@ -14609,7 +14609,7 @@
             <a:effectLst/>
             <a:extLst>
               <a:ext uri="{91240B29-F687-4f45-9708-019B960494DF}">
-                <a14:hiddenLine xmlns:a14="http://schemas.microsoft.com/office/drawing/2010/main" xmlns="" w="9525" cap="flat">
+                <a14:hiddenLine xmlns="" xmlns:a14="http://schemas.microsoft.com/office/drawing/2010/main" w="9525" cap="flat">
                   <a:solidFill>
                     <a:srgbClr val="808080"/>
                   </a:solidFill>
@@ -14619,7 +14619,7 @@
                 </a14:hiddenLine>
               </a:ext>
               <a:ext uri="{AF507438-7753-43e0-B8FC-AC1667EBCBE1}">
-                <a14:hiddenEffects xmlns:a14="http://schemas.microsoft.com/office/drawing/2010/main" xmlns="">
+                <a14:hiddenEffects xmlns="" xmlns:a14="http://schemas.microsoft.com/office/drawing/2010/main">
                   <a:effectLst>
                     <a:outerShdw blurRad="63500" dist="38099" dir="2700000" algn="ctr" rotWithShape="0">
                       <a:srgbClr val="000000">
@@ -14805,7 +14805,7 @@
             <a:effectLst/>
             <a:extLst>
               <a:ext uri="{91240B29-F687-4f45-9708-019B960494DF}">
-                <a14:hiddenLine xmlns:a14="http://schemas.microsoft.com/office/drawing/2010/main" xmlns="" w="9525" cap="flat">
+                <a14:hiddenLine xmlns="" xmlns:a14="http://schemas.microsoft.com/office/drawing/2010/main" w="9525" cap="flat">
                   <a:solidFill>
                     <a:srgbClr val="808080"/>
                   </a:solidFill>
@@ -14815,7 +14815,7 @@
                 </a14:hiddenLine>
               </a:ext>
               <a:ext uri="{AF507438-7753-43e0-B8FC-AC1667EBCBE1}">
-                <a14:hiddenEffects xmlns:a14="http://schemas.microsoft.com/office/drawing/2010/main" xmlns="">
+                <a14:hiddenEffects xmlns="" xmlns:a14="http://schemas.microsoft.com/office/drawing/2010/main">
                   <a:effectLst>
                     <a:outerShdw blurRad="63500" dist="38099" dir="2700000" algn="ctr" rotWithShape="0">
                       <a:srgbClr val="000000">
@@ -15041,7 +15041,7 @@
             <a:effectLst/>
             <a:extLst>
               <a:ext uri="{91240B29-F687-4f45-9708-019B960494DF}">
-                <a14:hiddenLine xmlns:a14="http://schemas.microsoft.com/office/drawing/2010/main" xmlns="" w="9525" cap="flat">
+                <a14:hiddenLine xmlns="" xmlns:a14="http://schemas.microsoft.com/office/drawing/2010/main" w="9525" cap="flat">
                   <a:solidFill>
                     <a:srgbClr val="808080"/>
                   </a:solidFill>
@@ -15051,7 +15051,7 @@
                 </a14:hiddenLine>
               </a:ext>
               <a:ext uri="{AF507438-7753-43e0-B8FC-AC1667EBCBE1}">
-                <a14:hiddenEffects xmlns:a14="http://schemas.microsoft.com/office/drawing/2010/main" xmlns="">
+                <a14:hiddenEffects xmlns="" xmlns:a14="http://schemas.microsoft.com/office/drawing/2010/main">
                   <a:effectLst>
                     <a:outerShdw blurRad="63500" dist="38099" dir="2700000" algn="ctr" rotWithShape="0">
                       <a:srgbClr val="000000">
@@ -15189,7 +15189,7 @@
             <a:effectLst/>
             <a:extLst>
               <a:ext uri="{91240B29-F687-4f45-9708-019B960494DF}">
-                <a14:hiddenLine xmlns:a14="http://schemas.microsoft.com/office/drawing/2010/main" xmlns="" w="9525" cap="flat">
+                <a14:hiddenLine xmlns="" xmlns:a14="http://schemas.microsoft.com/office/drawing/2010/main" w="9525" cap="flat">
                   <a:solidFill>
                     <a:srgbClr val="808080"/>
                   </a:solidFill>
@@ -15199,7 +15199,7 @@
                 </a14:hiddenLine>
               </a:ext>
               <a:ext uri="{AF507438-7753-43e0-B8FC-AC1667EBCBE1}">
-                <a14:hiddenEffects xmlns:a14="http://schemas.microsoft.com/office/drawing/2010/main" xmlns="">
+                <a14:hiddenEffects xmlns="" xmlns:a14="http://schemas.microsoft.com/office/drawing/2010/main">
                   <a:effectLst>
                     <a:outerShdw blurRad="63500" dist="38099" dir="2700000" algn="ctr" rotWithShape="0">
                       <a:srgbClr val="000000">
@@ -15485,7 +15485,7 @@
             <a:effectLst/>
             <a:extLst>
               <a:ext uri="{91240B29-F687-4f45-9708-019B960494DF}">
-                <a14:hiddenLine xmlns:a14="http://schemas.microsoft.com/office/drawing/2010/main" xmlns="" w="9525" cap="flat">
+                <a14:hiddenLine xmlns="" xmlns:a14="http://schemas.microsoft.com/office/drawing/2010/main" w="9525" cap="flat">
                   <a:solidFill>
                     <a:srgbClr val="808080"/>
                   </a:solidFill>
@@ -15495,7 +15495,7 @@
                 </a14:hiddenLine>
               </a:ext>
               <a:ext uri="{AF507438-7753-43e0-B8FC-AC1667EBCBE1}">
-                <a14:hiddenEffects xmlns:a14="http://schemas.microsoft.com/office/drawing/2010/main" xmlns="">
+                <a14:hiddenEffects xmlns="" xmlns:a14="http://schemas.microsoft.com/office/drawing/2010/main">
                   <a:effectLst>
                     <a:outerShdw blurRad="63500" dist="38099" dir="2700000" algn="ctr" rotWithShape="0">
                       <a:srgbClr val="000000">
@@ -15733,7 +15733,7 @@
             <a:effectLst/>
             <a:extLst>
               <a:ext uri="{91240B29-F687-4f45-9708-019B960494DF}">
-                <a14:hiddenLine xmlns:a14="http://schemas.microsoft.com/office/drawing/2010/main" xmlns="" w="9525" cap="flat">
+                <a14:hiddenLine xmlns="" xmlns:a14="http://schemas.microsoft.com/office/drawing/2010/main" w="9525" cap="flat">
                   <a:solidFill>
                     <a:srgbClr val="808080"/>
                   </a:solidFill>
@@ -15743,7 +15743,7 @@
                 </a14:hiddenLine>
               </a:ext>
               <a:ext uri="{AF507438-7753-43e0-B8FC-AC1667EBCBE1}">
-                <a14:hiddenEffects xmlns:a14="http://schemas.microsoft.com/office/drawing/2010/main" xmlns="">
+                <a14:hiddenEffects xmlns="" xmlns:a14="http://schemas.microsoft.com/office/drawing/2010/main">
                   <a:effectLst>
                     <a:outerShdw blurRad="63500" dist="38099" dir="2700000" algn="ctr" rotWithShape="0">
                       <a:srgbClr val="000000">
@@ -15929,7 +15929,7 @@
             <a:effectLst/>
             <a:extLst>
               <a:ext uri="{91240B29-F687-4f45-9708-019B960494DF}">
-                <a14:hiddenLine xmlns:a14="http://schemas.microsoft.com/office/drawing/2010/main" xmlns="" w="9525" cap="flat">
+                <a14:hiddenLine xmlns="" xmlns:a14="http://schemas.microsoft.com/office/drawing/2010/main" w="9525" cap="flat">
                   <a:solidFill>
                     <a:srgbClr val="808080"/>
                   </a:solidFill>
@@ -15939,7 +15939,7 @@
                 </a14:hiddenLine>
               </a:ext>
               <a:ext uri="{AF507438-7753-43e0-B8FC-AC1667EBCBE1}">
-                <a14:hiddenEffects xmlns:a14="http://schemas.microsoft.com/office/drawing/2010/main" xmlns="">
+                <a14:hiddenEffects xmlns="" xmlns:a14="http://schemas.microsoft.com/office/drawing/2010/main">
                   <a:effectLst>
                     <a:outerShdw blurRad="63500" dist="38099" dir="2700000" algn="ctr" rotWithShape="0">
                       <a:srgbClr val="000000">
@@ -16067,7 +16067,7 @@
             <a:effectLst/>
             <a:extLst>
               <a:ext uri="{91240B29-F687-4f45-9708-019B960494DF}">
-                <a14:hiddenLine xmlns:a14="http://schemas.microsoft.com/office/drawing/2010/main" xmlns="" w="9525" cap="flat">
+                <a14:hiddenLine xmlns="" xmlns:a14="http://schemas.microsoft.com/office/drawing/2010/main" w="9525" cap="flat">
                   <a:solidFill>
                     <a:srgbClr val="808080"/>
                   </a:solidFill>
@@ -16077,7 +16077,7 @@
                 </a14:hiddenLine>
               </a:ext>
               <a:ext uri="{AF507438-7753-43e0-B8FC-AC1667EBCBE1}">
-                <a14:hiddenEffects xmlns:a14="http://schemas.microsoft.com/office/drawing/2010/main" xmlns="">
+                <a14:hiddenEffects xmlns="" xmlns:a14="http://schemas.microsoft.com/office/drawing/2010/main">
                   <a:effectLst>
                     <a:outerShdw blurRad="63500" dist="38099" dir="2700000" algn="ctr" rotWithShape="0">
                       <a:srgbClr val="000000">
@@ -16196,7 +16196,7 @@
             <a:effectLst/>
             <a:extLst>
               <a:ext uri="{91240B29-F687-4f45-9708-019B960494DF}">
-                <a14:hiddenLine xmlns:a14="http://schemas.microsoft.com/office/drawing/2010/main" xmlns="" w="9525" cap="flat">
+                <a14:hiddenLine xmlns="" xmlns:a14="http://schemas.microsoft.com/office/drawing/2010/main" w="9525" cap="flat">
                   <a:solidFill>
                     <a:srgbClr val="808080"/>
                   </a:solidFill>
@@ -16206,7 +16206,7 @@
                 </a14:hiddenLine>
               </a:ext>
               <a:ext uri="{AF507438-7753-43e0-B8FC-AC1667EBCBE1}">
-                <a14:hiddenEffects xmlns:a14="http://schemas.microsoft.com/office/drawing/2010/main" xmlns="">
+                <a14:hiddenEffects xmlns="" xmlns:a14="http://schemas.microsoft.com/office/drawing/2010/main">
                   <a:effectLst>
                     <a:outerShdw blurRad="63500" dist="38099" dir="2700000" algn="ctr" rotWithShape="0">
                       <a:srgbClr val="000000">
@@ -16352,7 +16352,7 @@
             <a:effectLst/>
             <a:extLst>
               <a:ext uri="{91240B29-F687-4f45-9708-019B960494DF}">
-                <a14:hiddenLine xmlns:a14="http://schemas.microsoft.com/office/drawing/2010/main" xmlns="" w="9525" cap="flat">
+                <a14:hiddenLine xmlns="" xmlns:a14="http://schemas.microsoft.com/office/drawing/2010/main" w="9525" cap="flat">
                   <a:solidFill>
                     <a:srgbClr val="808080"/>
                   </a:solidFill>
@@ -16362,7 +16362,7 @@
                 </a14:hiddenLine>
               </a:ext>
               <a:ext uri="{AF507438-7753-43e0-B8FC-AC1667EBCBE1}">
-                <a14:hiddenEffects xmlns:a14="http://schemas.microsoft.com/office/drawing/2010/main" xmlns="">
+                <a14:hiddenEffects xmlns="" xmlns:a14="http://schemas.microsoft.com/office/drawing/2010/main">
                   <a:effectLst>
                     <a:outerShdw blurRad="63500" dist="38099" dir="2700000" algn="ctr" rotWithShape="0">
                       <a:srgbClr val="000000">
@@ -16542,7 +16542,7 @@
             <a:effectLst/>
             <a:extLst>
               <a:ext uri="{91240B29-F687-4f45-9708-019B960494DF}">
-                <a14:hiddenLine xmlns:a14="http://schemas.microsoft.com/office/drawing/2010/main" xmlns="" w="9525" cap="flat">
+                <a14:hiddenLine xmlns="" xmlns:a14="http://schemas.microsoft.com/office/drawing/2010/main" w="9525" cap="flat">
                   <a:solidFill>
                     <a:srgbClr val="808080"/>
                   </a:solidFill>
@@ -16552,7 +16552,7 @@
                 </a14:hiddenLine>
               </a:ext>
               <a:ext uri="{AF507438-7753-43e0-B8FC-AC1667EBCBE1}">
-                <a14:hiddenEffects xmlns:a14="http://schemas.microsoft.com/office/drawing/2010/main" xmlns="">
+                <a14:hiddenEffects xmlns="" xmlns:a14="http://schemas.microsoft.com/office/drawing/2010/main">
                   <a:effectLst>
                     <a:outerShdw blurRad="63500" dist="38099" dir="2700000" algn="ctr" rotWithShape="0">
                       <a:srgbClr val="000000">
@@ -20026,14 +20026,14 @@
           </a:ln>
           <a:extLst>
             <a:ext uri="{909E8E84-426E-40dd-AFC4-6F175D3DCCD1}">
-              <a14:hiddenFill xmlns:a14="http://schemas.microsoft.com/office/drawing/2010/main" xmlns="">
+              <a14:hiddenFill xmlns="" xmlns:a14="http://schemas.microsoft.com/office/drawing/2010/main">
                 <a:solidFill>
                   <a:srgbClr val="FFFFFF"/>
                 </a:solidFill>
               </a14:hiddenFill>
             </a:ext>
             <a:ext uri="{91240B29-F687-4f45-9708-019B960494DF}">
-              <a14:hiddenLine xmlns:a14="http://schemas.microsoft.com/office/drawing/2010/main" xmlns="" w="9525">
+              <a14:hiddenLine xmlns="" xmlns:a14="http://schemas.microsoft.com/office/drawing/2010/main" w="9525">
                 <a:solidFill>
                   <a:srgbClr val="000000"/>
                 </a:solidFill>
@@ -20043,7 +20043,7 @@
               </a14:hiddenLine>
             </a:ext>
             <a:ext uri="{FAA26D3D-D897-4be2-8F04-BA451C77F1D7}">
-              <ma14:placeholderFlag xmlns:ma14="http://schemas.microsoft.com/office/mac/drawingml/2011/main" xmlns="" val="1"/>
+              <ma14:placeholderFlag xmlns="" xmlns:ma14="http://schemas.microsoft.com/office/mac/drawingml/2011/main" val="1"/>
             </a:ext>
           </a:extLst>
         </p:spPr>
@@ -20088,14 +20088,14 @@
           </a:ln>
           <a:extLst>
             <a:ext uri="{909E8E84-426E-40dd-AFC4-6F175D3DCCD1}">
-              <a14:hiddenFill xmlns:a14="http://schemas.microsoft.com/office/drawing/2010/main" xmlns="">
+              <a14:hiddenFill xmlns="" xmlns:a14="http://schemas.microsoft.com/office/drawing/2010/main">
                 <a:solidFill>
                   <a:srgbClr val="FFFFFF"/>
                 </a:solidFill>
               </a14:hiddenFill>
             </a:ext>
             <a:ext uri="{91240B29-F687-4f45-9708-019B960494DF}">
-              <a14:hiddenLine xmlns:a14="http://schemas.microsoft.com/office/drawing/2010/main" xmlns="" w="9525">
+              <a14:hiddenLine xmlns="" xmlns:a14="http://schemas.microsoft.com/office/drawing/2010/main" w="9525">
                 <a:solidFill>
                   <a:srgbClr val="000000"/>
                 </a:solidFill>
@@ -20105,7 +20105,7 @@
               </a14:hiddenLine>
             </a:ext>
             <a:ext uri="{FAA26D3D-D897-4be2-8F04-BA451C77F1D7}">
-              <ma14:placeholderFlag xmlns:ma14="http://schemas.microsoft.com/office/mac/drawingml/2011/main" xmlns="" val="1"/>
+              <ma14:placeholderFlag xmlns="" xmlns:ma14="http://schemas.microsoft.com/office/mac/drawingml/2011/main" val="1"/>
             </a:ext>
           </a:extLst>
         </p:spPr>
@@ -21800,11 +21800,7 @@
           <a:p>
             <a:r>
               <a:rPr lang="en-US" smtClean="0"/>
-              <a:t>Data </a:t>
-            </a:r>
-            <a:r>
-              <a:rPr lang="en-US" smtClean="0"/>
-              <a:t>visualization using RStudio and ggplot </a:t>
+              <a:t>Data visualization using RStudio and ggplot </a:t>
             </a:r>
             <a:endParaRPr lang="en-US"/>
           </a:p>
@@ -24260,7 +24256,11 @@
           <a:p>
             <a:r>
               <a:rPr lang="en-US" smtClean="0"/>
-              <a:t>3.5.1 Exercises</a:t>
+              <a:t>3.6.1 </a:t>
+            </a:r>
+            <a:r>
+              <a:rPr lang="en-US" smtClean="0"/>
+              <a:t>Exercises</a:t>
             </a:r>
             <a:endParaRPr lang="en-US"/>
           </a:p>
@@ -28427,11 +28427,7 @@
             </a:r>
             <a:r>
               <a:rPr lang="en-US" smtClean="0"/>
-              <a:t>the </a:t>
-            </a:r>
-            <a:r>
-              <a:rPr lang="en-US" smtClean="0"/>
-              <a:t>cheat sheet </a:t>
+              <a:t>the cheat sheet </a:t>
             </a:r>
             <a:r>
               <a:rPr lang="en-US" dirty="0" smtClean="0"/>
@@ -28466,11 +28462,7 @@
             </a:r>
             <a:r>
               <a:rPr lang="en-US" smtClean="0"/>
-              <a:t>and </a:t>
-            </a:r>
-            <a:r>
-              <a:rPr lang="en-US" smtClean="0"/>
-              <a:t>history, data import wizard (and git)</a:t>
+              <a:t>and history, data import wizard (and git)</a:t>
             </a:r>
             <a:endParaRPr lang="en-US" dirty="0" smtClean="0"/>
           </a:p>
@@ -28798,11 +28790,7 @@
           <a:p>
             <a:r>
               <a:rPr lang="en-US" smtClean="0"/>
-              <a:t>RStudio </a:t>
-            </a:r>
-            <a:r>
-              <a:rPr lang="en-US" smtClean="0"/>
-              <a:t>projects</a:t>
+              <a:t>RStudio projects</a:t>
             </a:r>
             <a:endParaRPr lang="en-US"/>
           </a:p>
@@ -28839,7 +28827,6 @@
               <a:rPr lang="en-US" smtClean="0"/>
               <a:t>another. See the R4ds chapter.</a:t>
             </a:r>
-            <a:endParaRPr lang="en-US" smtClean="0"/>
           </a:p>
           <a:p>
             <a:r>
@@ -30216,6 +30203,61 @@
 </file>
 
 <file path=customXml/item1.xml><?xml version="1.0" encoding="utf-8"?>
+<p:properties xmlns:p="http://schemas.microsoft.com/office/2006/metadata/properties" xmlns:xsi="http://www.w3.org/2001/XMLSchema-instance" xmlns:pc="http://schemas.microsoft.com/office/infopath/2007/PartnerControls">
+  <documentManagement>
+    <PublishingRollupImage xmlns="http://schemas.microsoft.com/sharepoint/v3" xsi:nil="true"/>
+    <CSC_x0020_Language xmlns="b542780c-f3c1-48de-9090-e65480539529">
+      <Value>English</Value>
+    </CSC_x0020_Language>
+    <Translation xmlns="b542780c-f3c1-48de-9090-e65480539529">
+      <Url xsi:nil="true"/>
+      <Description xsi:nil="true"/>
+    </Translation>
+    <PublishingContactEmail xmlns="http://schemas.microsoft.com/sharepoint/v3" xsi:nil="true"/>
+    <PublishingPageContent xmlns="http://schemas.microsoft.com/sharepoint/v3" xsi:nil="true"/>
+    <PublishingVariationRelationshipLinkFieldID xmlns="http://schemas.microsoft.com/sharepoint/v3">
+      <Url xsi:nil="true"/>
+      <Description xsi:nil="true"/>
+    </PublishingVariationRelationshipLinkFieldID>
+    <CSC_x0020_Category xmlns="b542780c-f3c1-48de-9090-e65480539529">Templates</CSC_x0020_Category>
+    <SeoKeywords xmlns="http://schemas.microsoft.com/sharepoint/v3" xsi:nil="true"/>
+    <PublishingVariationGroupID xmlns="http://schemas.microsoft.com/sharepoint/v3" xsi:nil="true"/>
+    <PublishingIsFurlPage xmlns="http://schemas.microsoft.com/sharepoint/v3">false</PublishingIsFurlPage>
+    <Audience xmlns="http://schemas.microsoft.com/sharepoint/v3" xsi:nil="true"/>
+    <CSC_x0020_Group xmlns="b542780c-f3c1-48de-9090-e65480539529">MARCOM</CSC_x0020_Group>
+    <SeoBrowserTitle xmlns="http://schemas.microsoft.com/sharepoint/v3" xsi:nil="true"/>
+    <PublishingExpirationDate xmlns="http://schemas.microsoft.com/sharepoint/v3" xsi:nil="true"/>
+    <PublishingContactPicture xmlns="http://schemas.microsoft.com/sharepoint/v3">
+      <Url xsi:nil="true"/>
+      <Description xsi:nil="true"/>
+    </PublishingContactPicture>
+    <SeoRobotsNoIndex xmlns="http://schemas.microsoft.com/sharepoint/v3" xsi:nil="true"/>
+    <PublishingStartDate xmlns="http://schemas.microsoft.com/sharepoint/v3" xsi:nil="true"/>
+    <SeoMetaDescription xmlns="http://schemas.microsoft.com/sharepoint/v3" xsi:nil="true"/>
+    <PublishingContact xmlns="http://schemas.microsoft.com/sharepoint/v3">
+      <UserInfo>
+        <DisplayName/>
+        <AccountId xsi:nil="true"/>
+        <AccountType/>
+      </UserInfo>
+    </PublishingContact>
+    <PublishingContactName xmlns="http://schemas.microsoft.com/sharepoint/v3" xsi:nil="true"/>
+    <Comments xmlns="http://schemas.microsoft.com/sharepoint/v3">CSC's official PowerPoint-template
+Version 04.11.2016/Marketing and Communications</Comments>
+  </documentManagement>
+</p:properties>
+</file>
+
+<file path=customXml/item2.xml><?xml version="1.0" encoding="utf-8"?>
+<?mso-contentType ?>
+<FormTemplates xmlns="http://schemas.microsoft.com/sharepoint/v3/contenttype/forms">
+  <Display>DocumentLibraryForm</Display>
+  <Edit>DocumentLibraryForm</Edit>
+  <New>DocumentLibraryForm</New>
+</FormTemplates>
+</file>
+
+<file path=customXml/item3.xml><?xml version="1.0" encoding="utf-8"?>
 <ct:contentTypeSchema xmlns:ct="http://schemas.microsoft.com/office/2006/metadata/contentType" xmlns:ma="http://schemas.microsoft.com/office/2006/metadata/properties/metaAttributes" ct:_="" ma:_="" ma:contentTypeName="Guidelines Article" ma:contentTypeID="0x010100C568DB52D9D0A14D9B2FDCC96666E9F2007948130EC3DB064584E219954237AF39005865AF1693B9994CA07D29D3EBFFF69500D5CFB1A256BDC0439FEF5B0324F021D6" ma:contentTypeVersion="30" ma:contentTypeDescription="" ma:contentTypeScope="" ma:versionID="4cb75ce876bc9bb0bf3ca65d73c8002f">
   <xsd:schema xmlns:xsd="http://www.w3.org/2001/XMLSchema" xmlns:xs="http://www.w3.org/2001/XMLSchema" xmlns:p="http://schemas.microsoft.com/office/2006/metadata/properties" xmlns:ns1="http://schemas.microsoft.com/sharepoint/v3" xmlns:ns3="b542780c-f3c1-48de-9090-e65480539529" targetNamespace="http://schemas.microsoft.com/office/2006/metadata/properties" ma:root="true" ma:fieldsID="179bbc1ef3caf76c6e1127b99eabb6f9" ns1:_="" ns3:_="">
     <xsd:import namespace="http://schemas.microsoft.com/sharepoint/v3"/>
@@ -30592,62 +30634,32 @@
 </ct:contentTypeSchema>
 </file>
 
-<file path=customXml/item2.xml><?xml version="1.0" encoding="utf-8"?>
-<?mso-contentType ?>
-<FormTemplates xmlns="http://schemas.microsoft.com/sharepoint/v3/contenttype/forms">
-  <Display>DocumentLibraryForm</Display>
-  <Edit>DocumentLibraryForm</Edit>
-  <New>DocumentLibraryForm</New>
-</FormTemplates>
+<file path=customXml/itemProps1.xml><?xml version="1.0" encoding="utf-8"?>
+<ds:datastoreItem xmlns:ds="http://schemas.openxmlformats.org/officeDocument/2006/customXml" ds:itemID="{47279921-A1B4-472D-B7BD-F638B6892104}">
+  <ds:schemaRefs>
+    <ds:schemaRef ds:uri="http://schemas.microsoft.com/office/2006/documentManagement/types"/>
+    <ds:schemaRef ds:uri="http://schemas.openxmlformats.org/package/2006/metadata/core-properties"/>
+    <ds:schemaRef ds:uri="http://purl.org/dc/dcmitype/"/>
+    <ds:schemaRef ds:uri="http://www.w3.org/XML/1998/namespace"/>
+    <ds:schemaRef ds:uri="http://schemas.microsoft.com/sharepoint/v3"/>
+    <ds:schemaRef ds:uri="b542780c-f3c1-48de-9090-e65480539529"/>
+    <ds:schemaRef ds:uri="http://purl.org/dc/terms/"/>
+    <ds:schemaRef ds:uri="http://schemas.microsoft.com/office/infopath/2007/PartnerControls"/>
+    <ds:schemaRef ds:uri="http://schemas.microsoft.com/office/2006/metadata/properties"/>
+    <ds:schemaRef ds:uri="http://purl.org/dc/elements/1.1/"/>
+  </ds:schemaRefs>
+</ds:datastoreItem>
 </file>
 
-<file path=customXml/item3.xml><?xml version="1.0" encoding="utf-8"?>
-<p:properties xmlns:p="http://schemas.microsoft.com/office/2006/metadata/properties" xmlns:xsi="http://www.w3.org/2001/XMLSchema-instance" xmlns:pc="http://schemas.microsoft.com/office/infopath/2007/PartnerControls">
-  <documentManagement>
-    <PublishingRollupImage xmlns="http://schemas.microsoft.com/sharepoint/v3" xsi:nil="true"/>
-    <CSC_x0020_Language xmlns="b542780c-f3c1-48de-9090-e65480539529">
-      <Value>English</Value>
-    </CSC_x0020_Language>
-    <Translation xmlns="b542780c-f3c1-48de-9090-e65480539529">
-      <Url xsi:nil="true"/>
-      <Description xsi:nil="true"/>
-    </Translation>
-    <PublishingContactEmail xmlns="http://schemas.microsoft.com/sharepoint/v3" xsi:nil="true"/>
-    <PublishingPageContent xmlns="http://schemas.microsoft.com/sharepoint/v3" xsi:nil="true"/>
-    <PublishingVariationRelationshipLinkFieldID xmlns="http://schemas.microsoft.com/sharepoint/v3">
-      <Url xsi:nil="true"/>
-      <Description xsi:nil="true"/>
-    </PublishingVariationRelationshipLinkFieldID>
-    <CSC_x0020_Category xmlns="b542780c-f3c1-48de-9090-e65480539529">Templates</CSC_x0020_Category>
-    <SeoKeywords xmlns="http://schemas.microsoft.com/sharepoint/v3" xsi:nil="true"/>
-    <PublishingVariationGroupID xmlns="http://schemas.microsoft.com/sharepoint/v3" xsi:nil="true"/>
-    <PublishingIsFurlPage xmlns="http://schemas.microsoft.com/sharepoint/v3">false</PublishingIsFurlPage>
-    <Audience xmlns="http://schemas.microsoft.com/sharepoint/v3" xsi:nil="true"/>
-    <CSC_x0020_Group xmlns="b542780c-f3c1-48de-9090-e65480539529">MARCOM</CSC_x0020_Group>
-    <SeoBrowserTitle xmlns="http://schemas.microsoft.com/sharepoint/v3" xsi:nil="true"/>
-    <PublishingExpirationDate xmlns="http://schemas.microsoft.com/sharepoint/v3" xsi:nil="true"/>
-    <PublishingContactPicture xmlns="http://schemas.microsoft.com/sharepoint/v3">
-      <Url xsi:nil="true"/>
-      <Description xsi:nil="true"/>
-    </PublishingContactPicture>
-    <SeoRobotsNoIndex xmlns="http://schemas.microsoft.com/sharepoint/v3" xsi:nil="true"/>
-    <PublishingStartDate xmlns="http://schemas.microsoft.com/sharepoint/v3" xsi:nil="true"/>
-    <SeoMetaDescription xmlns="http://schemas.microsoft.com/sharepoint/v3" xsi:nil="true"/>
-    <PublishingContact xmlns="http://schemas.microsoft.com/sharepoint/v3">
-      <UserInfo>
-        <DisplayName/>
-        <AccountId xsi:nil="true"/>
-        <AccountType/>
-      </UserInfo>
-    </PublishingContact>
-    <PublishingContactName xmlns="http://schemas.microsoft.com/sharepoint/v3" xsi:nil="true"/>
-    <Comments xmlns="http://schemas.microsoft.com/sharepoint/v3">CSC's official PowerPoint-template
-Version 04.11.2016/Marketing and Communications</Comments>
-  </documentManagement>
-</p:properties>
+<file path=customXml/itemProps2.xml><?xml version="1.0" encoding="utf-8"?>
+<ds:datastoreItem xmlns:ds="http://schemas.openxmlformats.org/officeDocument/2006/customXml" ds:itemID="{D4C4CBFC-2EF1-4092-8F2F-5A5B86A85C2F}">
+  <ds:schemaRefs>
+    <ds:schemaRef ds:uri="http://schemas.microsoft.com/sharepoint/v3/contenttype/forms"/>
+  </ds:schemaRefs>
+</ds:datastoreItem>
 </file>
 
-<file path=customXml/itemProps1.xml><?xml version="1.0" encoding="utf-8"?>
+<file path=customXml/itemProps3.xml><?xml version="1.0" encoding="utf-8"?>
 <ds:datastoreItem xmlns:ds="http://schemas.openxmlformats.org/officeDocument/2006/customXml" ds:itemID="{652D4B87-A129-49B6-A00B-E280DAE4F0D2}">
   <ds:schemaRefs>
     <ds:schemaRef ds:uri="http://schemas.microsoft.com/office/2006/metadata/contentType"/>
@@ -30664,29 +30676,4 @@
     <ds:schemaRef ds:uri="http://schemas.microsoft.com/internal/obd"/>
   </ds:schemaRefs>
 </ds:datastoreItem>
-</file>
-
-<file path=customXml/itemProps2.xml><?xml version="1.0" encoding="utf-8"?>
-<ds:datastoreItem xmlns:ds="http://schemas.openxmlformats.org/officeDocument/2006/customXml" ds:itemID="{D4C4CBFC-2EF1-4092-8F2F-5A5B86A85C2F}">
-  <ds:schemaRefs>
-    <ds:schemaRef ds:uri="http://schemas.microsoft.com/sharepoint/v3/contenttype/forms"/>
-  </ds:schemaRefs>
-</ds:datastoreItem>
-</file>
-
-<file path=customXml/itemProps3.xml><?xml version="1.0" encoding="utf-8"?>
-<ds:datastoreItem xmlns:ds="http://schemas.openxmlformats.org/officeDocument/2006/customXml" ds:itemID="{47279921-A1B4-472D-B7BD-F638B6892104}">
-  <ds:schemaRefs>
-    <ds:schemaRef ds:uri="http://schemas.microsoft.com/office/2006/documentManagement/types"/>
-    <ds:schemaRef ds:uri="http://schemas.openxmlformats.org/package/2006/metadata/core-properties"/>
-    <ds:schemaRef ds:uri="http://purl.org/dc/dcmitype/"/>
-    <ds:schemaRef ds:uri="http://www.w3.org/XML/1998/namespace"/>
-    <ds:schemaRef ds:uri="http://schemas.microsoft.com/sharepoint/v3"/>
-    <ds:schemaRef ds:uri="b542780c-f3c1-48de-9090-e65480539529"/>
-    <ds:schemaRef ds:uri="http://purl.org/dc/terms/"/>
-    <ds:schemaRef ds:uri="http://schemas.microsoft.com/office/infopath/2007/PartnerControls"/>
-    <ds:schemaRef ds:uri="http://schemas.microsoft.com/office/2006/metadata/properties"/>
-    <ds:schemaRef ds:uri="http://purl.org/dc/elements/1.1/"/>
-  </ds:schemaRefs>
-</ds:datastoreItem>
 </file>
</xml_diff>